<commit_message>
updated surface & tif plots
</commit_message>
<xml_diff>
--- a/paper/fig-ppt/tif.pptx
+++ b/paper/fig-ppt/tif.pptx
@@ -2,12 +2,12 @@
 <file path=ppt/presentation.xml><?xml version="1.0" encoding="utf-8"?>
 <p:presentation xmlns:a="http://schemas.openxmlformats.org/drawingml/2006/main" xmlns:r="http://schemas.openxmlformats.org/officeDocument/2006/relationships" xmlns:p="http://schemas.openxmlformats.org/presentationml/2006/main" saveSubsetFonts="1">
   <p:sldMasterIdLst>
-    <p:sldMasterId id="2147483684" r:id="rId1"/>
+    <p:sldMasterId id="2147483696" r:id="rId1"/>
   </p:sldMasterIdLst>
   <p:sldIdLst>
     <p:sldId id="263" r:id="rId2"/>
   </p:sldIdLst>
-  <p:sldSz cx="6119813" cy="1968500"/>
+  <p:sldSz cx="5303838" cy="1968500"/>
   <p:notesSz cx="6858000" cy="9144000"/>
   <p:defaultTextStyle>
     <a:defPPr>
@@ -114,7 +114,7 @@
 
 <file path=ppt/slideLayouts/slideLayout1.xml><?xml version="1.0" encoding="utf-8"?>
 <p:sldLayout xmlns:a="http://schemas.openxmlformats.org/drawingml/2006/main" xmlns:r="http://schemas.openxmlformats.org/officeDocument/2006/relationships" xmlns:p="http://schemas.openxmlformats.org/presentationml/2006/main" type="title" preserve="1">
-  <p:cSld name="标题幻灯片">
+  <p:cSld name="Title Slide">
     <p:spTree>
       <p:nvGrpSpPr>
         <p:cNvPr id="1" name=""/>
@@ -141,8 +141,8 @@
         </p:nvSpPr>
         <p:spPr>
           <a:xfrm>
-            <a:off x="764977" y="322160"/>
-            <a:ext cx="4589860" cy="685330"/>
+            <a:off x="662980" y="322160"/>
+            <a:ext cx="3977879" cy="685330"/>
           </a:xfrm>
         </p:spPr>
         <p:txBody>
@@ -154,8 +154,8 @@
           </a:lstStyle>
           <a:p>
             <a:r>
-              <a:rPr lang="zh-CN" altLang="en-US"/>
-              <a:t>单击此处编辑母版标题样式</a:t>
+              <a:rPr lang="en-US"/>
+              <a:t>Click to edit Master title style</a:t>
             </a:r>
             <a:endParaRPr lang="en-US" dirty="0"/>
           </a:p>
@@ -173,8 +173,8 @@
         </p:nvSpPr>
         <p:spPr>
           <a:xfrm>
-            <a:off x="764977" y="1033918"/>
-            <a:ext cx="4589860" cy="475265"/>
+            <a:off x="662980" y="1033918"/>
+            <a:ext cx="3977879" cy="475265"/>
           </a:xfrm>
         </p:spPr>
         <p:txBody>
@@ -219,8 +219,8 @@
           </a:lstStyle>
           <a:p>
             <a:r>
-              <a:rPr lang="zh-CN" altLang="en-US"/>
-              <a:t>单击此处编辑母版副标题样式</a:t>
+              <a:rPr lang="en-US"/>
+              <a:t>Click to edit Master subtitle style</a:t>
             </a:r>
             <a:endParaRPr lang="en-US" dirty="0"/>
           </a:p>
@@ -243,7 +243,7 @@
           <a:p>
             <a:fld id="{81F8C734-572D-41E3-B33F-97B553EA4E90}" type="datetimeFigureOut">
               <a:rPr lang="zh-CN" altLang="en-US" smtClean="0"/>
-              <a:t>2022/8/31</a:t>
+              <a:t>2022/9/1</a:t>
             </a:fld>
             <a:endParaRPr lang="zh-CN" altLang="en-US"/>
           </a:p>
@@ -294,7 +294,7 @@
     </p:spTree>
     <p:extLst>
       <p:ext uri="{BB962C8B-B14F-4D97-AF65-F5344CB8AC3E}">
-        <p14:creationId xmlns:p14="http://schemas.microsoft.com/office/powerpoint/2010/main" val="578085306"/>
+        <p14:creationId xmlns:p14="http://schemas.microsoft.com/office/powerpoint/2010/main" val="4189431068"/>
       </p:ext>
     </p:extLst>
   </p:cSld>
@@ -306,7 +306,7 @@
 
 <file path=ppt/slideLayouts/slideLayout10.xml><?xml version="1.0" encoding="utf-8"?>
 <p:sldLayout xmlns:a="http://schemas.openxmlformats.org/drawingml/2006/main" xmlns:r="http://schemas.openxmlformats.org/officeDocument/2006/relationships" xmlns:p="http://schemas.openxmlformats.org/presentationml/2006/main" type="vertTx" preserve="1">
-  <p:cSld name="标题和竖排文字">
+  <p:cSld name="Title and Vertical Text">
     <p:spTree>
       <p:nvGrpSpPr>
         <p:cNvPr id="1" name=""/>
@@ -337,8 +337,8 @@
           <a:lstStyle/>
           <a:p>
             <a:r>
-              <a:rPr lang="zh-CN" altLang="en-US"/>
-              <a:t>单击此处编辑母版标题样式</a:t>
+              <a:rPr lang="en-US"/>
+              <a:t>Click to edit Master title style</a:t>
             </a:r>
             <a:endParaRPr lang="en-US" dirty="0"/>
           </a:p>
@@ -361,36 +361,36 @@
           <a:p>
             <a:pPr lvl="0"/>
             <a:r>
-              <a:rPr lang="zh-CN" altLang="en-US"/>
-              <a:t>单击此处编辑母版文本样式</a:t>
+              <a:rPr lang="en-US"/>
+              <a:t>Click to edit Master text styles</a:t>
             </a:r>
           </a:p>
           <a:p>
             <a:pPr lvl="1"/>
             <a:r>
-              <a:rPr lang="zh-CN" altLang="en-US"/>
-              <a:t>二级</a:t>
+              <a:rPr lang="en-US"/>
+              <a:t>Second level</a:t>
             </a:r>
           </a:p>
           <a:p>
             <a:pPr lvl="2"/>
             <a:r>
-              <a:rPr lang="zh-CN" altLang="en-US"/>
-              <a:t>三级</a:t>
+              <a:rPr lang="en-US"/>
+              <a:t>Third level</a:t>
             </a:r>
           </a:p>
           <a:p>
             <a:pPr lvl="3"/>
             <a:r>
-              <a:rPr lang="zh-CN" altLang="en-US"/>
-              <a:t>四级</a:t>
+              <a:rPr lang="en-US"/>
+              <a:t>Fourth level</a:t>
             </a:r>
           </a:p>
           <a:p>
             <a:pPr lvl="4"/>
             <a:r>
-              <a:rPr lang="zh-CN" altLang="en-US"/>
-              <a:t>五级</a:t>
+              <a:rPr lang="en-US"/>
+              <a:t>Fifth level</a:t>
             </a:r>
             <a:endParaRPr lang="en-US" dirty="0"/>
           </a:p>
@@ -413,7 +413,7 @@
           <a:p>
             <a:fld id="{81F8C734-572D-41E3-B33F-97B553EA4E90}" type="datetimeFigureOut">
               <a:rPr lang="zh-CN" altLang="en-US" smtClean="0"/>
-              <a:t>2022/8/31</a:t>
+              <a:t>2022/9/1</a:t>
             </a:fld>
             <a:endParaRPr lang="zh-CN" altLang="en-US"/>
           </a:p>
@@ -464,7 +464,7 @@
     </p:spTree>
     <p:extLst>
       <p:ext uri="{BB962C8B-B14F-4D97-AF65-F5344CB8AC3E}">
-        <p14:creationId xmlns:p14="http://schemas.microsoft.com/office/powerpoint/2010/main" val="3322215861"/>
+        <p14:creationId xmlns:p14="http://schemas.microsoft.com/office/powerpoint/2010/main" val="3999829624"/>
       </p:ext>
     </p:extLst>
   </p:cSld>
@@ -476,7 +476,7 @@
 
 <file path=ppt/slideLayouts/slideLayout11.xml><?xml version="1.0" encoding="utf-8"?>
 <p:sldLayout xmlns:a="http://schemas.openxmlformats.org/drawingml/2006/main" xmlns:r="http://schemas.openxmlformats.org/officeDocument/2006/relationships" xmlns:p="http://schemas.openxmlformats.org/presentationml/2006/main" type="vertTitleAndTx" preserve="1">
-  <p:cSld name="竖排标题与文本">
+  <p:cSld name="Vertical Title and Text">
     <p:spTree>
       <p:nvGrpSpPr>
         <p:cNvPr id="1" name=""/>
@@ -503,8 +503,8 @@
         </p:nvSpPr>
         <p:spPr>
           <a:xfrm>
-            <a:off x="4379491" y="104804"/>
-            <a:ext cx="1319585" cy="1668213"/>
+            <a:off x="3795559" y="104804"/>
+            <a:ext cx="1143640" cy="1668213"/>
           </a:xfrm>
         </p:spPr>
         <p:txBody>
@@ -512,8 +512,8 @@
           <a:lstStyle/>
           <a:p>
             <a:r>
-              <a:rPr lang="zh-CN" altLang="en-US"/>
-              <a:t>单击此处编辑母版标题样式</a:t>
+              <a:rPr lang="en-US"/>
+              <a:t>Click to edit Master title style</a:t>
             </a:r>
             <a:endParaRPr lang="en-US" dirty="0"/>
           </a:p>
@@ -531,8 +531,8 @@
         </p:nvSpPr>
         <p:spPr>
           <a:xfrm>
-            <a:off x="420737" y="104804"/>
-            <a:ext cx="3882256" cy="1668213"/>
+            <a:off x="364639" y="104804"/>
+            <a:ext cx="3364622" cy="1668213"/>
           </a:xfrm>
         </p:spPr>
         <p:txBody>
@@ -541,36 +541,36 @@
           <a:p>
             <a:pPr lvl="0"/>
             <a:r>
-              <a:rPr lang="zh-CN" altLang="en-US"/>
-              <a:t>单击此处编辑母版文本样式</a:t>
+              <a:rPr lang="en-US"/>
+              <a:t>Click to edit Master text styles</a:t>
             </a:r>
           </a:p>
           <a:p>
             <a:pPr lvl="1"/>
             <a:r>
-              <a:rPr lang="zh-CN" altLang="en-US"/>
-              <a:t>二级</a:t>
+              <a:rPr lang="en-US"/>
+              <a:t>Second level</a:t>
             </a:r>
           </a:p>
           <a:p>
             <a:pPr lvl="2"/>
             <a:r>
-              <a:rPr lang="zh-CN" altLang="en-US"/>
-              <a:t>三级</a:t>
+              <a:rPr lang="en-US"/>
+              <a:t>Third level</a:t>
             </a:r>
           </a:p>
           <a:p>
             <a:pPr lvl="3"/>
             <a:r>
-              <a:rPr lang="zh-CN" altLang="en-US"/>
-              <a:t>四级</a:t>
+              <a:rPr lang="en-US"/>
+              <a:t>Fourth level</a:t>
             </a:r>
           </a:p>
           <a:p>
             <a:pPr lvl="4"/>
             <a:r>
-              <a:rPr lang="zh-CN" altLang="en-US"/>
-              <a:t>五级</a:t>
+              <a:rPr lang="en-US"/>
+              <a:t>Fifth level</a:t>
             </a:r>
             <a:endParaRPr lang="en-US" dirty="0"/>
           </a:p>
@@ -593,7 +593,7 @@
           <a:p>
             <a:fld id="{81F8C734-572D-41E3-B33F-97B553EA4E90}" type="datetimeFigureOut">
               <a:rPr lang="zh-CN" altLang="en-US" smtClean="0"/>
-              <a:t>2022/8/31</a:t>
+              <a:t>2022/9/1</a:t>
             </a:fld>
             <a:endParaRPr lang="zh-CN" altLang="en-US"/>
           </a:p>
@@ -644,7 +644,7 @@
     </p:spTree>
     <p:extLst>
       <p:ext uri="{BB962C8B-B14F-4D97-AF65-F5344CB8AC3E}">
-        <p14:creationId xmlns:p14="http://schemas.microsoft.com/office/powerpoint/2010/main" val="2201163013"/>
+        <p14:creationId xmlns:p14="http://schemas.microsoft.com/office/powerpoint/2010/main" val="1720020906"/>
       </p:ext>
     </p:extLst>
   </p:cSld>
@@ -656,7 +656,7 @@
 
 <file path=ppt/slideLayouts/slideLayout2.xml><?xml version="1.0" encoding="utf-8"?>
 <p:sldLayout xmlns:a="http://schemas.openxmlformats.org/drawingml/2006/main" xmlns:r="http://schemas.openxmlformats.org/officeDocument/2006/relationships" xmlns:p="http://schemas.openxmlformats.org/presentationml/2006/main" type="obj" preserve="1">
-  <p:cSld name="标题和内容">
+  <p:cSld name="Title and Content">
     <p:spTree>
       <p:nvGrpSpPr>
         <p:cNvPr id="1" name=""/>
@@ -687,8 +687,8 @@
           <a:lstStyle/>
           <a:p>
             <a:r>
-              <a:rPr lang="zh-CN" altLang="en-US"/>
-              <a:t>单击此处编辑母版标题样式</a:t>
+              <a:rPr lang="en-US"/>
+              <a:t>Click to edit Master title style</a:t>
             </a:r>
             <a:endParaRPr lang="en-US" dirty="0"/>
           </a:p>
@@ -711,36 +711,36 @@
           <a:p>
             <a:pPr lvl="0"/>
             <a:r>
-              <a:rPr lang="zh-CN" altLang="en-US"/>
-              <a:t>单击此处编辑母版文本样式</a:t>
+              <a:rPr lang="en-US"/>
+              <a:t>Click to edit Master text styles</a:t>
             </a:r>
           </a:p>
           <a:p>
             <a:pPr lvl="1"/>
             <a:r>
-              <a:rPr lang="zh-CN" altLang="en-US"/>
-              <a:t>二级</a:t>
+              <a:rPr lang="en-US"/>
+              <a:t>Second level</a:t>
             </a:r>
           </a:p>
           <a:p>
             <a:pPr lvl="2"/>
             <a:r>
-              <a:rPr lang="zh-CN" altLang="en-US"/>
-              <a:t>三级</a:t>
+              <a:rPr lang="en-US"/>
+              <a:t>Third level</a:t>
             </a:r>
           </a:p>
           <a:p>
             <a:pPr lvl="3"/>
             <a:r>
-              <a:rPr lang="zh-CN" altLang="en-US"/>
-              <a:t>四级</a:t>
+              <a:rPr lang="en-US"/>
+              <a:t>Fourth level</a:t>
             </a:r>
           </a:p>
           <a:p>
             <a:pPr lvl="4"/>
             <a:r>
-              <a:rPr lang="zh-CN" altLang="en-US"/>
-              <a:t>五级</a:t>
+              <a:rPr lang="en-US"/>
+              <a:t>Fifth level</a:t>
             </a:r>
             <a:endParaRPr lang="en-US" dirty="0"/>
           </a:p>
@@ -763,7 +763,7 @@
           <a:p>
             <a:fld id="{81F8C734-572D-41E3-B33F-97B553EA4E90}" type="datetimeFigureOut">
               <a:rPr lang="zh-CN" altLang="en-US" smtClean="0"/>
-              <a:t>2022/8/31</a:t>
+              <a:t>2022/9/1</a:t>
             </a:fld>
             <a:endParaRPr lang="zh-CN" altLang="en-US"/>
           </a:p>
@@ -814,7 +814,7 @@
     </p:spTree>
     <p:extLst>
       <p:ext uri="{BB962C8B-B14F-4D97-AF65-F5344CB8AC3E}">
-        <p14:creationId xmlns:p14="http://schemas.microsoft.com/office/powerpoint/2010/main" val="861298258"/>
+        <p14:creationId xmlns:p14="http://schemas.microsoft.com/office/powerpoint/2010/main" val="2578605443"/>
       </p:ext>
     </p:extLst>
   </p:cSld>
@@ -826,7 +826,7 @@
 
 <file path=ppt/slideLayouts/slideLayout3.xml><?xml version="1.0" encoding="utf-8"?>
 <p:sldLayout xmlns:a="http://schemas.openxmlformats.org/drawingml/2006/main" xmlns:r="http://schemas.openxmlformats.org/officeDocument/2006/relationships" xmlns:p="http://schemas.openxmlformats.org/presentationml/2006/main" type="secHead" preserve="1">
-  <p:cSld name="节标题">
+  <p:cSld name="Section Header">
     <p:spTree>
       <p:nvGrpSpPr>
         <p:cNvPr id="1" name=""/>
@@ -853,8 +853,8 @@
         </p:nvSpPr>
         <p:spPr>
           <a:xfrm>
-            <a:off x="417550" y="490758"/>
-            <a:ext cx="5278339" cy="818841"/>
+            <a:off x="361877" y="490758"/>
+            <a:ext cx="4574560" cy="818841"/>
           </a:xfrm>
         </p:spPr>
         <p:txBody>
@@ -866,8 +866,8 @@
           </a:lstStyle>
           <a:p>
             <a:r>
-              <a:rPr lang="zh-CN" altLang="en-US"/>
-              <a:t>单击此处编辑母版标题样式</a:t>
+              <a:rPr lang="en-US"/>
+              <a:t>Click to edit Master title style</a:t>
             </a:r>
             <a:endParaRPr lang="en-US" dirty="0"/>
           </a:p>
@@ -885,8 +885,8 @@
         </p:nvSpPr>
         <p:spPr>
           <a:xfrm>
-            <a:off x="417550" y="1317346"/>
-            <a:ext cx="5278339" cy="430609"/>
+            <a:off x="361877" y="1317346"/>
+            <a:ext cx="4574560" cy="430609"/>
           </a:xfrm>
         </p:spPr>
         <p:txBody>
@@ -986,8 +986,8 @@
           <a:p>
             <a:pPr lvl="0"/>
             <a:r>
-              <a:rPr lang="zh-CN" altLang="en-US"/>
-              <a:t>单击此处编辑母版文本样式</a:t>
+              <a:rPr lang="en-US"/>
+              <a:t>Click to edit Master text styles</a:t>
             </a:r>
           </a:p>
         </p:txBody>
@@ -1009,7 +1009,7 @@
           <a:p>
             <a:fld id="{81F8C734-572D-41E3-B33F-97B553EA4E90}" type="datetimeFigureOut">
               <a:rPr lang="zh-CN" altLang="en-US" smtClean="0"/>
-              <a:t>2022/8/31</a:t>
+              <a:t>2022/9/1</a:t>
             </a:fld>
             <a:endParaRPr lang="zh-CN" altLang="en-US"/>
           </a:p>
@@ -1060,7 +1060,7 @@
     </p:spTree>
     <p:extLst>
       <p:ext uri="{BB962C8B-B14F-4D97-AF65-F5344CB8AC3E}">
-        <p14:creationId xmlns:p14="http://schemas.microsoft.com/office/powerpoint/2010/main" val="198392747"/>
+        <p14:creationId xmlns:p14="http://schemas.microsoft.com/office/powerpoint/2010/main" val="3470863392"/>
       </p:ext>
     </p:extLst>
   </p:cSld>
@@ -1072,7 +1072,7 @@
 
 <file path=ppt/slideLayouts/slideLayout4.xml><?xml version="1.0" encoding="utf-8"?>
 <p:sldLayout xmlns:a="http://schemas.openxmlformats.org/drawingml/2006/main" xmlns:r="http://schemas.openxmlformats.org/officeDocument/2006/relationships" xmlns:p="http://schemas.openxmlformats.org/presentationml/2006/main" type="twoObj" preserve="1">
-  <p:cSld name="两栏内容">
+  <p:cSld name="Two Content">
     <p:spTree>
       <p:nvGrpSpPr>
         <p:cNvPr id="1" name=""/>
@@ -1103,8 +1103,8 @@
           <a:lstStyle/>
           <a:p>
             <a:r>
-              <a:rPr lang="zh-CN" altLang="en-US"/>
-              <a:t>单击此处编辑母版标题样式</a:t>
+              <a:rPr lang="en-US"/>
+              <a:t>Click to edit Master title style</a:t>
             </a:r>
             <a:endParaRPr lang="en-US" dirty="0"/>
           </a:p>
@@ -1122,8 +1122,8 @@
         </p:nvSpPr>
         <p:spPr>
           <a:xfrm>
-            <a:off x="420737" y="524022"/>
-            <a:ext cx="2600921" cy="1248995"/>
+            <a:off x="364639" y="524022"/>
+            <a:ext cx="2254131" cy="1248995"/>
           </a:xfrm>
         </p:spPr>
         <p:txBody>
@@ -1132,36 +1132,36 @@
           <a:p>
             <a:pPr lvl="0"/>
             <a:r>
-              <a:rPr lang="zh-CN" altLang="en-US"/>
-              <a:t>单击此处编辑母版文本样式</a:t>
+              <a:rPr lang="en-US"/>
+              <a:t>Click to edit Master text styles</a:t>
             </a:r>
           </a:p>
           <a:p>
             <a:pPr lvl="1"/>
             <a:r>
-              <a:rPr lang="zh-CN" altLang="en-US"/>
-              <a:t>二级</a:t>
+              <a:rPr lang="en-US"/>
+              <a:t>Second level</a:t>
             </a:r>
           </a:p>
           <a:p>
             <a:pPr lvl="2"/>
             <a:r>
-              <a:rPr lang="zh-CN" altLang="en-US"/>
-              <a:t>三级</a:t>
+              <a:rPr lang="en-US"/>
+              <a:t>Third level</a:t>
             </a:r>
           </a:p>
           <a:p>
             <a:pPr lvl="3"/>
             <a:r>
-              <a:rPr lang="zh-CN" altLang="en-US"/>
-              <a:t>四级</a:t>
+              <a:rPr lang="en-US"/>
+              <a:t>Fourth level</a:t>
             </a:r>
           </a:p>
           <a:p>
             <a:pPr lvl="4"/>
             <a:r>
-              <a:rPr lang="zh-CN" altLang="en-US"/>
-              <a:t>五级</a:t>
+              <a:rPr lang="en-US"/>
+              <a:t>Fifth level</a:t>
             </a:r>
             <a:endParaRPr lang="en-US" dirty="0"/>
           </a:p>
@@ -1179,8 +1179,8 @@
         </p:nvSpPr>
         <p:spPr>
           <a:xfrm>
-            <a:off x="3098155" y="524022"/>
-            <a:ext cx="2600921" cy="1248995"/>
+            <a:off x="2685068" y="524022"/>
+            <a:ext cx="2254131" cy="1248995"/>
           </a:xfrm>
         </p:spPr>
         <p:txBody>
@@ -1189,36 +1189,36 @@
           <a:p>
             <a:pPr lvl="0"/>
             <a:r>
-              <a:rPr lang="zh-CN" altLang="en-US"/>
-              <a:t>单击此处编辑母版文本样式</a:t>
+              <a:rPr lang="en-US"/>
+              <a:t>Click to edit Master text styles</a:t>
             </a:r>
           </a:p>
           <a:p>
             <a:pPr lvl="1"/>
             <a:r>
-              <a:rPr lang="zh-CN" altLang="en-US"/>
-              <a:t>二级</a:t>
+              <a:rPr lang="en-US"/>
+              <a:t>Second level</a:t>
             </a:r>
           </a:p>
           <a:p>
             <a:pPr lvl="2"/>
             <a:r>
-              <a:rPr lang="zh-CN" altLang="en-US"/>
-              <a:t>三级</a:t>
+              <a:rPr lang="en-US"/>
+              <a:t>Third level</a:t>
             </a:r>
           </a:p>
           <a:p>
             <a:pPr lvl="3"/>
             <a:r>
-              <a:rPr lang="zh-CN" altLang="en-US"/>
-              <a:t>四级</a:t>
+              <a:rPr lang="en-US"/>
+              <a:t>Fourth level</a:t>
             </a:r>
           </a:p>
           <a:p>
             <a:pPr lvl="4"/>
             <a:r>
-              <a:rPr lang="zh-CN" altLang="en-US"/>
-              <a:t>五级</a:t>
+              <a:rPr lang="en-US"/>
+              <a:t>Fifth level</a:t>
             </a:r>
             <a:endParaRPr lang="en-US" dirty="0"/>
           </a:p>
@@ -1241,7 +1241,7 @@
           <a:p>
             <a:fld id="{81F8C734-572D-41E3-B33F-97B553EA4E90}" type="datetimeFigureOut">
               <a:rPr lang="zh-CN" altLang="en-US" smtClean="0"/>
-              <a:t>2022/8/31</a:t>
+              <a:t>2022/9/1</a:t>
             </a:fld>
             <a:endParaRPr lang="zh-CN" altLang="en-US"/>
           </a:p>
@@ -1292,7 +1292,7 @@
     </p:spTree>
     <p:extLst>
       <p:ext uri="{BB962C8B-B14F-4D97-AF65-F5344CB8AC3E}">
-        <p14:creationId xmlns:p14="http://schemas.microsoft.com/office/powerpoint/2010/main" val="1355243951"/>
+        <p14:creationId xmlns:p14="http://schemas.microsoft.com/office/powerpoint/2010/main" val="3378703062"/>
       </p:ext>
     </p:extLst>
   </p:cSld>
@@ -1304,7 +1304,7 @@
 
 <file path=ppt/slideLayouts/slideLayout5.xml><?xml version="1.0" encoding="utf-8"?>
 <p:sldLayout xmlns:a="http://schemas.openxmlformats.org/drawingml/2006/main" xmlns:r="http://schemas.openxmlformats.org/officeDocument/2006/relationships" xmlns:p="http://schemas.openxmlformats.org/presentationml/2006/main" type="twoTxTwoObj" preserve="1">
-  <p:cSld name="比较">
+  <p:cSld name="Comparison">
     <p:spTree>
       <p:nvGrpSpPr>
         <p:cNvPr id="1" name=""/>
@@ -1331,8 +1331,8 @@
         </p:nvSpPr>
         <p:spPr>
           <a:xfrm>
-            <a:off x="421534" y="104804"/>
-            <a:ext cx="5278339" cy="380486"/>
+            <a:off x="365330" y="104804"/>
+            <a:ext cx="4574560" cy="380486"/>
           </a:xfrm>
         </p:spPr>
         <p:txBody>
@@ -1340,8 +1340,8 @@
           <a:lstStyle/>
           <a:p>
             <a:r>
-              <a:rPr lang="zh-CN" altLang="en-US"/>
-              <a:t>单击此处编辑母版标题样式</a:t>
+              <a:rPr lang="en-US"/>
+              <a:t>Click to edit Master title style</a:t>
             </a:r>
             <a:endParaRPr lang="en-US" dirty="0"/>
           </a:p>
@@ -1359,8 +1359,8 @@
         </p:nvSpPr>
         <p:spPr>
           <a:xfrm>
-            <a:off x="421534" y="482556"/>
-            <a:ext cx="2588968" cy="236493"/>
+            <a:off x="365330" y="482556"/>
+            <a:ext cx="2243772" cy="236493"/>
           </a:xfrm>
         </p:spPr>
         <p:txBody>
@@ -1406,8 +1406,8 @@
           <a:p>
             <a:pPr lvl="0"/>
             <a:r>
-              <a:rPr lang="zh-CN" altLang="en-US"/>
-              <a:t>单击此处编辑母版文本样式</a:t>
+              <a:rPr lang="en-US"/>
+              <a:t>Click to edit Master text styles</a:t>
             </a:r>
           </a:p>
         </p:txBody>
@@ -1424,8 +1424,8 @@
         </p:nvSpPr>
         <p:spPr>
           <a:xfrm>
-            <a:off x="421534" y="719049"/>
-            <a:ext cx="2588968" cy="1057613"/>
+            <a:off x="365330" y="719049"/>
+            <a:ext cx="2243772" cy="1057613"/>
           </a:xfrm>
         </p:spPr>
         <p:txBody>
@@ -1434,36 +1434,36 @@
           <a:p>
             <a:pPr lvl="0"/>
             <a:r>
-              <a:rPr lang="zh-CN" altLang="en-US"/>
-              <a:t>单击此处编辑母版文本样式</a:t>
+              <a:rPr lang="en-US"/>
+              <a:t>Click to edit Master text styles</a:t>
             </a:r>
           </a:p>
           <a:p>
             <a:pPr lvl="1"/>
             <a:r>
-              <a:rPr lang="zh-CN" altLang="en-US"/>
-              <a:t>二级</a:t>
+              <a:rPr lang="en-US"/>
+              <a:t>Second level</a:t>
             </a:r>
           </a:p>
           <a:p>
             <a:pPr lvl="2"/>
             <a:r>
-              <a:rPr lang="zh-CN" altLang="en-US"/>
-              <a:t>三级</a:t>
+              <a:rPr lang="en-US"/>
+              <a:t>Third level</a:t>
             </a:r>
           </a:p>
           <a:p>
             <a:pPr lvl="3"/>
             <a:r>
-              <a:rPr lang="zh-CN" altLang="en-US"/>
-              <a:t>四级</a:t>
+              <a:rPr lang="en-US"/>
+              <a:t>Fourth level</a:t>
             </a:r>
           </a:p>
           <a:p>
             <a:pPr lvl="4"/>
             <a:r>
-              <a:rPr lang="zh-CN" altLang="en-US"/>
-              <a:t>五级</a:t>
+              <a:rPr lang="en-US"/>
+              <a:t>Fifth level</a:t>
             </a:r>
             <a:endParaRPr lang="en-US" dirty="0"/>
           </a:p>
@@ -1481,8 +1481,8 @@
         </p:nvSpPr>
         <p:spPr>
           <a:xfrm>
-            <a:off x="3098155" y="482556"/>
-            <a:ext cx="2601718" cy="236493"/>
+            <a:off x="2685068" y="482556"/>
+            <a:ext cx="2254822" cy="236493"/>
           </a:xfrm>
         </p:spPr>
         <p:txBody>
@@ -1528,8 +1528,8 @@
           <a:p>
             <a:pPr lvl="0"/>
             <a:r>
-              <a:rPr lang="zh-CN" altLang="en-US"/>
-              <a:t>单击此处编辑母版文本样式</a:t>
+              <a:rPr lang="en-US"/>
+              <a:t>Click to edit Master text styles</a:t>
             </a:r>
           </a:p>
         </p:txBody>
@@ -1546,8 +1546,8 @@
         </p:nvSpPr>
         <p:spPr>
           <a:xfrm>
-            <a:off x="3098155" y="719049"/>
-            <a:ext cx="2601718" cy="1057613"/>
+            <a:off x="2685068" y="719049"/>
+            <a:ext cx="2254822" cy="1057613"/>
           </a:xfrm>
         </p:spPr>
         <p:txBody>
@@ -1556,36 +1556,36 @@
           <a:p>
             <a:pPr lvl="0"/>
             <a:r>
-              <a:rPr lang="zh-CN" altLang="en-US"/>
-              <a:t>单击此处编辑母版文本样式</a:t>
+              <a:rPr lang="en-US"/>
+              <a:t>Click to edit Master text styles</a:t>
             </a:r>
           </a:p>
           <a:p>
             <a:pPr lvl="1"/>
             <a:r>
-              <a:rPr lang="zh-CN" altLang="en-US"/>
-              <a:t>二级</a:t>
+              <a:rPr lang="en-US"/>
+              <a:t>Second level</a:t>
             </a:r>
           </a:p>
           <a:p>
             <a:pPr lvl="2"/>
             <a:r>
-              <a:rPr lang="zh-CN" altLang="en-US"/>
-              <a:t>三级</a:t>
+              <a:rPr lang="en-US"/>
+              <a:t>Third level</a:t>
             </a:r>
           </a:p>
           <a:p>
             <a:pPr lvl="3"/>
             <a:r>
-              <a:rPr lang="zh-CN" altLang="en-US"/>
-              <a:t>四级</a:t>
+              <a:rPr lang="en-US"/>
+              <a:t>Fourth level</a:t>
             </a:r>
           </a:p>
           <a:p>
             <a:pPr lvl="4"/>
             <a:r>
-              <a:rPr lang="zh-CN" altLang="en-US"/>
-              <a:t>五级</a:t>
+              <a:rPr lang="en-US"/>
+              <a:t>Fifth level</a:t>
             </a:r>
             <a:endParaRPr lang="en-US" dirty="0"/>
           </a:p>
@@ -1608,7 +1608,7 @@
           <a:p>
             <a:fld id="{81F8C734-572D-41E3-B33F-97B553EA4E90}" type="datetimeFigureOut">
               <a:rPr lang="zh-CN" altLang="en-US" smtClean="0"/>
-              <a:t>2022/8/31</a:t>
+              <a:t>2022/9/1</a:t>
             </a:fld>
             <a:endParaRPr lang="zh-CN" altLang="en-US"/>
           </a:p>
@@ -1659,7 +1659,7 @@
     </p:spTree>
     <p:extLst>
       <p:ext uri="{BB962C8B-B14F-4D97-AF65-F5344CB8AC3E}">
-        <p14:creationId xmlns:p14="http://schemas.microsoft.com/office/powerpoint/2010/main" val="1383314275"/>
+        <p14:creationId xmlns:p14="http://schemas.microsoft.com/office/powerpoint/2010/main" val="2468685960"/>
       </p:ext>
     </p:extLst>
   </p:cSld>
@@ -1671,7 +1671,7 @@
 
 <file path=ppt/slideLayouts/slideLayout6.xml><?xml version="1.0" encoding="utf-8"?>
 <p:sldLayout xmlns:a="http://schemas.openxmlformats.org/drawingml/2006/main" xmlns:r="http://schemas.openxmlformats.org/officeDocument/2006/relationships" xmlns:p="http://schemas.openxmlformats.org/presentationml/2006/main" type="titleOnly" preserve="1">
-  <p:cSld name="仅标题">
+  <p:cSld name="Title Only">
     <p:spTree>
       <p:nvGrpSpPr>
         <p:cNvPr id="1" name=""/>
@@ -1702,8 +1702,8 @@
           <a:lstStyle/>
           <a:p>
             <a:r>
-              <a:rPr lang="zh-CN" altLang="en-US"/>
-              <a:t>单击此处编辑母版标题样式</a:t>
+              <a:rPr lang="en-US"/>
+              <a:t>Click to edit Master title style</a:t>
             </a:r>
             <a:endParaRPr lang="en-US" dirty="0"/>
           </a:p>
@@ -1726,7 +1726,7 @@
           <a:p>
             <a:fld id="{81F8C734-572D-41E3-B33F-97B553EA4E90}" type="datetimeFigureOut">
               <a:rPr lang="zh-CN" altLang="en-US" smtClean="0"/>
-              <a:t>2022/8/31</a:t>
+              <a:t>2022/9/1</a:t>
             </a:fld>
             <a:endParaRPr lang="zh-CN" altLang="en-US"/>
           </a:p>
@@ -1777,7 +1777,7 @@
     </p:spTree>
     <p:extLst>
       <p:ext uri="{BB962C8B-B14F-4D97-AF65-F5344CB8AC3E}">
-        <p14:creationId xmlns:p14="http://schemas.microsoft.com/office/powerpoint/2010/main" val="3194888228"/>
+        <p14:creationId xmlns:p14="http://schemas.microsoft.com/office/powerpoint/2010/main" val="379695773"/>
       </p:ext>
     </p:extLst>
   </p:cSld>
@@ -1789,7 +1789,7 @@
 
 <file path=ppt/slideLayouts/slideLayout7.xml><?xml version="1.0" encoding="utf-8"?>
 <p:sldLayout xmlns:a="http://schemas.openxmlformats.org/drawingml/2006/main" xmlns:r="http://schemas.openxmlformats.org/officeDocument/2006/relationships" xmlns:p="http://schemas.openxmlformats.org/presentationml/2006/main" type="blank" preserve="1">
-  <p:cSld name="空白">
+  <p:cSld name="Blank">
     <p:spTree>
       <p:nvGrpSpPr>
         <p:cNvPr id="1" name=""/>
@@ -1821,7 +1821,7 @@
           <a:p>
             <a:fld id="{81F8C734-572D-41E3-B33F-97B553EA4E90}" type="datetimeFigureOut">
               <a:rPr lang="zh-CN" altLang="en-US" smtClean="0"/>
-              <a:t>2022/8/31</a:t>
+              <a:t>2022/9/1</a:t>
             </a:fld>
             <a:endParaRPr lang="zh-CN" altLang="en-US"/>
           </a:p>
@@ -1872,7 +1872,7 @@
     </p:spTree>
     <p:extLst>
       <p:ext uri="{BB962C8B-B14F-4D97-AF65-F5344CB8AC3E}">
-        <p14:creationId xmlns:p14="http://schemas.microsoft.com/office/powerpoint/2010/main" val="1120676345"/>
+        <p14:creationId xmlns:p14="http://schemas.microsoft.com/office/powerpoint/2010/main" val="1877839897"/>
       </p:ext>
     </p:extLst>
   </p:cSld>
@@ -1884,7 +1884,7 @@
 
 <file path=ppt/slideLayouts/slideLayout8.xml><?xml version="1.0" encoding="utf-8"?>
 <p:sldLayout xmlns:a="http://schemas.openxmlformats.org/drawingml/2006/main" xmlns:r="http://schemas.openxmlformats.org/officeDocument/2006/relationships" xmlns:p="http://schemas.openxmlformats.org/presentationml/2006/main" type="objTx" preserve="1">
-  <p:cSld name="内容与标题">
+  <p:cSld name="Content with Caption">
     <p:spTree>
       <p:nvGrpSpPr>
         <p:cNvPr id="1" name=""/>
@@ -1911,8 +1911,8 @@
         </p:nvSpPr>
         <p:spPr>
           <a:xfrm>
-            <a:off x="421534" y="131233"/>
-            <a:ext cx="1973799" cy="459317"/>
+            <a:off x="365330" y="131233"/>
+            <a:ext cx="1710626" cy="459317"/>
           </a:xfrm>
         </p:spPr>
         <p:txBody>
@@ -1924,8 +1924,8 @@
           </a:lstStyle>
           <a:p>
             <a:r>
-              <a:rPr lang="zh-CN" altLang="en-US"/>
-              <a:t>单击此处编辑母版标题样式</a:t>
+              <a:rPr lang="en-US"/>
+              <a:t>Click to edit Master title style</a:t>
             </a:r>
             <a:endParaRPr lang="en-US" dirty="0"/>
           </a:p>
@@ -1943,8 +1943,8 @@
         </p:nvSpPr>
         <p:spPr>
           <a:xfrm>
-            <a:off x="2601718" y="283428"/>
-            <a:ext cx="3098155" cy="1398911"/>
+            <a:off x="2254822" y="283428"/>
+            <a:ext cx="2685068" cy="1398911"/>
           </a:xfrm>
         </p:spPr>
         <p:txBody>
@@ -1981,36 +1981,36 @@
           <a:p>
             <a:pPr lvl="0"/>
             <a:r>
-              <a:rPr lang="zh-CN" altLang="en-US"/>
-              <a:t>单击此处编辑母版文本样式</a:t>
+              <a:rPr lang="en-US"/>
+              <a:t>Click to edit Master text styles</a:t>
             </a:r>
           </a:p>
           <a:p>
             <a:pPr lvl="1"/>
             <a:r>
-              <a:rPr lang="zh-CN" altLang="en-US"/>
-              <a:t>二级</a:t>
+              <a:rPr lang="en-US"/>
+              <a:t>Second level</a:t>
             </a:r>
           </a:p>
           <a:p>
             <a:pPr lvl="2"/>
             <a:r>
-              <a:rPr lang="zh-CN" altLang="en-US"/>
-              <a:t>三级</a:t>
+              <a:rPr lang="en-US"/>
+              <a:t>Third level</a:t>
             </a:r>
           </a:p>
           <a:p>
             <a:pPr lvl="3"/>
             <a:r>
-              <a:rPr lang="zh-CN" altLang="en-US"/>
-              <a:t>四级</a:t>
+              <a:rPr lang="en-US"/>
+              <a:t>Fourth level</a:t>
             </a:r>
           </a:p>
           <a:p>
             <a:pPr lvl="4"/>
             <a:r>
-              <a:rPr lang="zh-CN" altLang="en-US"/>
-              <a:t>五级</a:t>
+              <a:rPr lang="en-US"/>
+              <a:t>Fifth level</a:t>
             </a:r>
             <a:endParaRPr lang="en-US" dirty="0"/>
           </a:p>
@@ -2028,8 +2028,8 @@
         </p:nvSpPr>
         <p:spPr>
           <a:xfrm>
-            <a:off x="421534" y="590550"/>
-            <a:ext cx="1973799" cy="1094067"/>
+            <a:off x="365330" y="590550"/>
+            <a:ext cx="1710626" cy="1094067"/>
           </a:xfrm>
         </p:spPr>
         <p:txBody>
@@ -2075,8 +2075,8 @@
           <a:p>
             <a:pPr lvl="0"/>
             <a:r>
-              <a:rPr lang="zh-CN" altLang="en-US"/>
-              <a:t>单击此处编辑母版文本样式</a:t>
+              <a:rPr lang="en-US"/>
+              <a:t>Click to edit Master text styles</a:t>
             </a:r>
           </a:p>
         </p:txBody>
@@ -2098,7 +2098,7 @@
           <a:p>
             <a:fld id="{81F8C734-572D-41E3-B33F-97B553EA4E90}" type="datetimeFigureOut">
               <a:rPr lang="zh-CN" altLang="en-US" smtClean="0"/>
-              <a:t>2022/8/31</a:t>
+              <a:t>2022/9/1</a:t>
             </a:fld>
             <a:endParaRPr lang="zh-CN" altLang="en-US"/>
           </a:p>
@@ -2149,7 +2149,7 @@
     </p:spTree>
     <p:extLst>
       <p:ext uri="{BB962C8B-B14F-4D97-AF65-F5344CB8AC3E}">
-        <p14:creationId xmlns:p14="http://schemas.microsoft.com/office/powerpoint/2010/main" val="1650244164"/>
+        <p14:creationId xmlns:p14="http://schemas.microsoft.com/office/powerpoint/2010/main" val="2350346163"/>
       </p:ext>
     </p:extLst>
   </p:cSld>
@@ -2161,7 +2161,7 @@
 
 <file path=ppt/slideLayouts/slideLayout9.xml><?xml version="1.0" encoding="utf-8"?>
 <p:sldLayout xmlns:a="http://schemas.openxmlformats.org/drawingml/2006/main" xmlns:r="http://schemas.openxmlformats.org/officeDocument/2006/relationships" xmlns:p="http://schemas.openxmlformats.org/presentationml/2006/main" type="picTx" preserve="1">
-  <p:cSld name="图片与标题">
+  <p:cSld name="Picture with Caption">
     <p:spTree>
       <p:nvGrpSpPr>
         <p:cNvPr id="1" name=""/>
@@ -2188,8 +2188,8 @@
         </p:nvSpPr>
         <p:spPr>
           <a:xfrm>
-            <a:off x="421534" y="131233"/>
-            <a:ext cx="1973799" cy="459317"/>
+            <a:off x="365330" y="131233"/>
+            <a:ext cx="1710626" cy="459317"/>
           </a:xfrm>
         </p:spPr>
         <p:txBody>
@@ -2201,8 +2201,8 @@
           </a:lstStyle>
           <a:p>
             <a:r>
-              <a:rPr lang="zh-CN" altLang="en-US"/>
-              <a:t>单击此处编辑母版标题样式</a:t>
+              <a:rPr lang="en-US"/>
+              <a:t>Click to edit Master title style</a:t>
             </a:r>
             <a:endParaRPr lang="en-US" dirty="0"/>
           </a:p>
@@ -2220,8 +2220,8 @@
         </p:nvSpPr>
         <p:spPr>
           <a:xfrm>
-            <a:off x="2601718" y="283428"/>
-            <a:ext cx="3098155" cy="1398911"/>
+            <a:off x="2254822" y="283428"/>
+            <a:ext cx="2685068" cy="1398911"/>
           </a:xfrm>
         </p:spPr>
         <p:txBody>
@@ -2266,8 +2266,8 @@
           </a:lstStyle>
           <a:p>
             <a:r>
-              <a:rPr lang="zh-CN" altLang="en-US"/>
-              <a:t>单击图标添加图片</a:t>
+              <a:rPr lang="en-US"/>
+              <a:t>Click icon to add picture</a:t>
             </a:r>
             <a:endParaRPr lang="en-US" dirty="0"/>
           </a:p>
@@ -2285,8 +2285,8 @@
         </p:nvSpPr>
         <p:spPr>
           <a:xfrm>
-            <a:off x="421534" y="590550"/>
-            <a:ext cx="1973799" cy="1094067"/>
+            <a:off x="365330" y="590550"/>
+            <a:ext cx="1710626" cy="1094067"/>
           </a:xfrm>
         </p:spPr>
         <p:txBody>
@@ -2332,8 +2332,8 @@
           <a:p>
             <a:pPr lvl="0"/>
             <a:r>
-              <a:rPr lang="zh-CN" altLang="en-US"/>
-              <a:t>单击此处编辑母版文本样式</a:t>
+              <a:rPr lang="en-US"/>
+              <a:t>Click to edit Master text styles</a:t>
             </a:r>
           </a:p>
         </p:txBody>
@@ -2355,7 +2355,7 @@
           <a:p>
             <a:fld id="{81F8C734-572D-41E3-B33F-97B553EA4E90}" type="datetimeFigureOut">
               <a:rPr lang="zh-CN" altLang="en-US" smtClean="0"/>
-              <a:t>2022/8/31</a:t>
+              <a:t>2022/9/1</a:t>
             </a:fld>
             <a:endParaRPr lang="zh-CN" altLang="en-US"/>
           </a:p>
@@ -2406,7 +2406,7 @@
     </p:spTree>
     <p:extLst>
       <p:ext uri="{BB962C8B-B14F-4D97-AF65-F5344CB8AC3E}">
-        <p14:creationId xmlns:p14="http://schemas.microsoft.com/office/powerpoint/2010/main" val="2080968064"/>
+        <p14:creationId xmlns:p14="http://schemas.microsoft.com/office/powerpoint/2010/main" val="2019489060"/>
       </p:ext>
     </p:extLst>
   </p:cSld>
@@ -2450,8 +2450,8 @@
         </p:nvSpPr>
         <p:spPr>
           <a:xfrm>
-            <a:off x="420737" y="104804"/>
-            <a:ext cx="5278339" cy="380486"/>
+            <a:off x="364639" y="104804"/>
+            <a:ext cx="4574560" cy="380486"/>
           </a:xfrm>
           <a:prstGeom prst="rect">
             <a:avLst/>
@@ -2464,8 +2464,8 @@
           <a:lstStyle/>
           <a:p>
             <a:r>
-              <a:rPr lang="zh-CN" altLang="en-US"/>
-              <a:t>单击此处编辑母版标题样式</a:t>
+              <a:rPr lang="en-US"/>
+              <a:t>Click to edit Master title style</a:t>
             </a:r>
             <a:endParaRPr lang="en-US" dirty="0"/>
           </a:p>
@@ -2483,8 +2483,8 @@
         </p:nvSpPr>
         <p:spPr>
           <a:xfrm>
-            <a:off x="420737" y="524022"/>
-            <a:ext cx="5278339" cy="1248995"/>
+            <a:off x="364639" y="524022"/>
+            <a:ext cx="4574560" cy="1248995"/>
           </a:xfrm>
           <a:prstGeom prst="rect">
             <a:avLst/>
@@ -2498,36 +2498,36 @@
           <a:p>
             <a:pPr lvl="0"/>
             <a:r>
-              <a:rPr lang="zh-CN" altLang="en-US"/>
-              <a:t>单击此处编辑母版文本样式</a:t>
+              <a:rPr lang="en-US"/>
+              <a:t>Click to edit Master text styles</a:t>
             </a:r>
           </a:p>
           <a:p>
             <a:pPr lvl="1"/>
             <a:r>
-              <a:rPr lang="zh-CN" altLang="en-US"/>
-              <a:t>二级</a:t>
+              <a:rPr lang="en-US"/>
+              <a:t>Second level</a:t>
             </a:r>
           </a:p>
           <a:p>
             <a:pPr lvl="2"/>
             <a:r>
-              <a:rPr lang="zh-CN" altLang="en-US"/>
-              <a:t>三级</a:t>
+              <a:rPr lang="en-US"/>
+              <a:t>Third level</a:t>
             </a:r>
           </a:p>
           <a:p>
             <a:pPr lvl="3"/>
             <a:r>
-              <a:rPr lang="zh-CN" altLang="en-US"/>
-              <a:t>四级</a:t>
+              <a:rPr lang="en-US"/>
+              <a:t>Fourth level</a:t>
             </a:r>
           </a:p>
           <a:p>
             <a:pPr lvl="4"/>
             <a:r>
-              <a:rPr lang="zh-CN" altLang="en-US"/>
-              <a:t>五级</a:t>
+              <a:rPr lang="en-US"/>
+              <a:t>Fifth level</a:t>
             </a:r>
             <a:endParaRPr lang="en-US" dirty="0"/>
           </a:p>
@@ -2545,8 +2545,8 @@
         </p:nvSpPr>
         <p:spPr>
           <a:xfrm>
-            <a:off x="420737" y="1824508"/>
-            <a:ext cx="1376958" cy="104804"/>
+            <a:off x="364639" y="1824508"/>
+            <a:ext cx="1193364" cy="104804"/>
           </a:xfrm>
           <a:prstGeom prst="rect">
             <a:avLst/>
@@ -2568,7 +2568,7 @@
           <a:p>
             <a:fld id="{81F8C734-572D-41E3-B33F-97B553EA4E90}" type="datetimeFigureOut">
               <a:rPr lang="zh-CN" altLang="en-US" smtClean="0"/>
-              <a:t>2022/8/31</a:t>
+              <a:t>2022/9/1</a:t>
             </a:fld>
             <a:endParaRPr lang="zh-CN" altLang="en-US"/>
           </a:p>
@@ -2586,8 +2586,8 @@
         </p:nvSpPr>
         <p:spPr>
           <a:xfrm>
-            <a:off x="2027188" y="1824508"/>
-            <a:ext cx="2065437" cy="104804"/>
+            <a:off x="1756897" y="1824508"/>
+            <a:ext cx="1790045" cy="104804"/>
           </a:xfrm>
           <a:prstGeom prst="rect">
             <a:avLst/>
@@ -2623,8 +2623,8 @@
         </p:nvSpPr>
         <p:spPr>
           <a:xfrm>
-            <a:off x="4322118" y="1824508"/>
-            <a:ext cx="1376958" cy="104804"/>
+            <a:off x="3745835" y="1824508"/>
+            <a:ext cx="1193364" cy="104804"/>
           </a:xfrm>
           <a:prstGeom prst="rect">
             <a:avLst/>
@@ -2655,23 +2655,23 @@
     </p:spTree>
     <p:extLst>
       <p:ext uri="{BB962C8B-B14F-4D97-AF65-F5344CB8AC3E}">
-        <p14:creationId xmlns:p14="http://schemas.microsoft.com/office/powerpoint/2010/main" val="2313784173"/>
+        <p14:creationId xmlns:p14="http://schemas.microsoft.com/office/powerpoint/2010/main" val="4074901525"/>
       </p:ext>
     </p:extLst>
   </p:cSld>
   <p:clrMap bg1="lt1" tx1="dk1" bg2="lt2" tx2="dk2" accent1="accent1" accent2="accent2" accent3="accent3" accent4="accent4" accent5="accent5" accent6="accent6" hlink="hlink" folHlink="folHlink"/>
   <p:sldLayoutIdLst>
-    <p:sldLayoutId id="2147483685" r:id="rId1"/>
-    <p:sldLayoutId id="2147483686" r:id="rId2"/>
-    <p:sldLayoutId id="2147483687" r:id="rId3"/>
-    <p:sldLayoutId id="2147483688" r:id="rId4"/>
-    <p:sldLayoutId id="2147483689" r:id="rId5"/>
-    <p:sldLayoutId id="2147483690" r:id="rId6"/>
-    <p:sldLayoutId id="2147483691" r:id="rId7"/>
-    <p:sldLayoutId id="2147483692" r:id="rId8"/>
-    <p:sldLayoutId id="2147483693" r:id="rId9"/>
-    <p:sldLayoutId id="2147483694" r:id="rId10"/>
-    <p:sldLayoutId id="2147483695" r:id="rId11"/>
+    <p:sldLayoutId id="2147483697" r:id="rId1"/>
+    <p:sldLayoutId id="2147483698" r:id="rId2"/>
+    <p:sldLayoutId id="2147483699" r:id="rId3"/>
+    <p:sldLayoutId id="2147483700" r:id="rId4"/>
+    <p:sldLayoutId id="2147483701" r:id="rId5"/>
+    <p:sldLayoutId id="2147483702" r:id="rId6"/>
+    <p:sldLayoutId id="2147483703" r:id="rId7"/>
+    <p:sldLayoutId id="2147483704" r:id="rId8"/>
+    <p:sldLayoutId id="2147483705" r:id="rId9"/>
+    <p:sldLayoutId id="2147483706" r:id="rId10"/>
+    <p:sldLayoutId id="2147483707" r:id="rId11"/>
   </p:sldLayoutIdLst>
   <p:txStyles>
     <p:titleStyle>
@@ -2973,810 +2973,840 @@
           <a:chExt cx="0" cy="0"/>
         </a:xfrm>
       </p:grpSpPr>
-      <p:pic>
-        <p:nvPicPr>
-          <p:cNvPr id="23" name="图片 22">
+      <p:grpSp>
+        <p:nvGrpSpPr>
+          <p:cNvPr id="34" name="Group 33">
             <a:extLst>
               <a:ext uri="{FF2B5EF4-FFF2-40B4-BE49-F238E27FC236}">
-                <a16:creationId xmlns:a16="http://schemas.microsoft.com/office/drawing/2014/main" id="{8367D3E5-BEF4-E8ED-8CDE-3249D45A33B4}"/>
+                <a16:creationId xmlns:a16="http://schemas.microsoft.com/office/drawing/2014/main" id="{5FEFEDD7-1598-A158-796C-956B65B8CEC0}"/>
               </a:ext>
             </a:extLst>
           </p:cNvPr>
-          <p:cNvPicPr>
-            <a:picLocks noChangeAspect="1"/>
-          </p:cNvPicPr>
+          <p:cNvGrpSpPr/>
           <p:nvPr/>
-        </p:nvPicPr>
-        <p:blipFill rotWithShape="1">
-          <a:blip r:embed="rId2"/>
-          <a:srcRect l="78774" t="15842" r="11220" b="14014"/>
-          <a:stretch/>
-        </p:blipFill>
-        <p:spPr>
+        </p:nvGrpSpPr>
+        <p:grpSpPr>
           <a:xfrm>
-            <a:off x="5674396" y="442260"/>
-            <a:ext cx="274028" cy="1253488"/>
+            <a:off x="26393" y="-56680"/>
+            <a:ext cx="5369625" cy="2012480"/>
+            <a:chOff x="455018" y="-63534"/>
+            <a:chExt cx="5369625" cy="2012480"/>
           </a:xfrm>
-          <a:prstGeom prst="rect">
-            <a:avLst/>
-          </a:prstGeom>
-        </p:spPr>
-      </p:pic>
-      <p:sp>
-        <p:nvSpPr>
-          <p:cNvPr id="4" name="文本框 9">
-            <a:extLst>
-              <a:ext uri="{FF2B5EF4-FFF2-40B4-BE49-F238E27FC236}">
-                <a16:creationId xmlns:a16="http://schemas.microsoft.com/office/drawing/2014/main" id="{B8C8AEF7-59F2-FD66-D965-4D6F8128216F}"/>
-              </a:ext>
-            </a:extLst>
-          </p:cNvPr>
-          <p:cNvSpPr txBox="1"/>
-          <p:nvPr/>
-        </p:nvSpPr>
-        <p:spPr>
-          <a:xfrm>
-            <a:off x="3887104" y="-20041"/>
-            <a:ext cx="452368" cy="369332"/>
-          </a:xfrm>
-          <a:prstGeom prst="rect">
-            <a:avLst/>
-          </a:prstGeom>
-          <a:noFill/>
-        </p:spPr>
-        <p:txBody>
-          <a:bodyPr wrap="none" rtlCol="0">
-            <a:spAutoFit/>
-          </a:bodyPr>
-          <a:lstStyle/>
-          <a:p>
-            <a:r>
-              <a:rPr lang="en-US" altLang="zh-CN" b="1" dirty="0">
+        </p:grpSpPr>
+        <p:sp>
+          <p:nvSpPr>
+            <p:cNvPr id="35" name="文本框 9">
+              <a:extLst>
+                <a:ext uri="{FF2B5EF4-FFF2-40B4-BE49-F238E27FC236}">
+                  <a16:creationId xmlns:a16="http://schemas.microsoft.com/office/drawing/2014/main" id="{DB2CA21B-15CF-89F3-1E6D-14B59F52EAE3}"/>
+                </a:ext>
+              </a:extLst>
+            </p:cNvPr>
+            <p:cNvSpPr txBox="1"/>
+            <p:nvPr/>
+          </p:nvSpPr>
+          <p:spPr>
+            <a:xfrm>
+              <a:off x="3505387" y="-20041"/>
+              <a:ext cx="452368" cy="369332"/>
+            </a:xfrm>
+            <a:prstGeom prst="rect">
+              <a:avLst/>
+            </a:prstGeom>
+            <a:noFill/>
+          </p:spPr>
+          <p:txBody>
+            <a:bodyPr wrap="none" rtlCol="0">
+              <a:spAutoFit/>
+            </a:bodyPr>
+            <a:lstStyle/>
+            <a:p>
+              <a:r>
+                <a:rPr lang="en-US" altLang="zh-CN" b="1" dirty="0">
+                  <a:cs typeface="Times New Roman" panose="02020603050405020304" pitchFamily="18" charset="0"/>
+                </a:rPr>
+                <a:t>(b)</a:t>
+              </a:r>
+              <a:endParaRPr lang="zh-CN" altLang="en-US" b="1" dirty="0">
                 <a:cs typeface="Times New Roman" panose="02020603050405020304" pitchFamily="18" charset="0"/>
-              </a:rPr>
-              <a:t>(b)</a:t>
-            </a:r>
-            <a:endParaRPr lang="zh-CN" altLang="en-US" b="1" dirty="0">
-              <a:cs typeface="Times New Roman" panose="02020603050405020304" pitchFamily="18" charset="0"/>
-            </a:endParaRPr>
-          </a:p>
-        </p:txBody>
-      </p:sp>
-      <p:sp>
-        <p:nvSpPr>
-          <p:cNvPr id="6" name="文本框 9">
-            <a:extLst>
-              <a:ext uri="{FF2B5EF4-FFF2-40B4-BE49-F238E27FC236}">
-                <a16:creationId xmlns:a16="http://schemas.microsoft.com/office/drawing/2014/main" id="{719A60B9-7D4B-8A92-BE0C-6868B204A3AF}"/>
-              </a:ext>
-            </a:extLst>
-          </p:cNvPr>
-          <p:cNvSpPr txBox="1"/>
-          <p:nvPr/>
-        </p:nvSpPr>
-        <p:spPr>
-          <a:xfrm>
-            <a:off x="4189694" y="-63534"/>
-            <a:ext cx="1484702" cy="584775"/>
-          </a:xfrm>
-          <a:prstGeom prst="rect">
-            <a:avLst/>
-          </a:prstGeom>
-          <a:noFill/>
-          <a:ln>
+              </a:endParaRPr>
+            </a:p>
+          </p:txBody>
+        </p:sp>
+        <p:pic>
+          <p:nvPicPr>
+            <p:cNvPr id="36" name="图片 22">
+              <a:extLst>
+                <a:ext uri="{FF2B5EF4-FFF2-40B4-BE49-F238E27FC236}">
+                  <a16:creationId xmlns:a16="http://schemas.microsoft.com/office/drawing/2014/main" id="{E3AA082E-C207-619F-6B9C-38C5527B20AD}"/>
+                </a:ext>
+              </a:extLst>
+            </p:cNvPr>
+            <p:cNvPicPr>
+              <a:picLocks noChangeAspect="1"/>
+            </p:cNvPicPr>
+            <p:nvPr/>
+          </p:nvPicPr>
+          <p:blipFill rotWithShape="1">
+            <a:blip r:embed="rId2"/>
+            <a:srcRect l="78774" t="15842" r="11220" b="14014"/>
+            <a:stretch/>
+          </p:blipFill>
+          <p:spPr>
+            <a:xfrm>
+              <a:off x="5292679" y="442260"/>
+              <a:ext cx="274028" cy="1253488"/>
+            </a:xfrm>
+            <a:prstGeom prst="rect">
+              <a:avLst/>
+            </a:prstGeom>
+          </p:spPr>
+        </p:pic>
+        <p:sp>
+          <p:nvSpPr>
+            <p:cNvPr id="37" name="文本框 9">
+              <a:extLst>
+                <a:ext uri="{FF2B5EF4-FFF2-40B4-BE49-F238E27FC236}">
+                  <a16:creationId xmlns:a16="http://schemas.microsoft.com/office/drawing/2014/main" id="{355EEDC0-9585-CF19-264F-A4FD04F31136}"/>
+                </a:ext>
+              </a:extLst>
+            </p:cNvPr>
+            <p:cNvSpPr txBox="1"/>
+            <p:nvPr/>
+          </p:nvSpPr>
+          <p:spPr>
+            <a:xfrm>
+              <a:off x="3807977" y="-63534"/>
+              <a:ext cx="1484702" cy="584775"/>
+            </a:xfrm>
+            <a:prstGeom prst="rect">
+              <a:avLst/>
+            </a:prstGeom>
             <a:noFill/>
-          </a:ln>
-        </p:spPr>
-        <p:txBody>
-          <a:bodyPr wrap="none" rtlCol="0">
-            <a:spAutoFit/>
-          </a:bodyPr>
-          <a:lstStyle/>
-          <a:p>
-            <a:pPr algn="ctr"/>
-            <a:r>
-              <a:rPr lang="en-US" altLang="zh-CN" sz="1600" dirty="0">
+            <a:ln>
+              <a:noFill/>
+            </a:ln>
+          </p:spPr>
+          <p:txBody>
+            <a:bodyPr wrap="none" rtlCol="0">
+              <a:spAutoFit/>
+            </a:bodyPr>
+            <a:lstStyle/>
+            <a:p>
+              <a:pPr algn="ctr"/>
+              <a:r>
+                <a:rPr lang="en-US" altLang="zh-CN" sz="1600" dirty="0">
+                  <a:cs typeface="Times New Roman" panose="02020603050405020304" pitchFamily="18" charset="0"/>
+                </a:rPr>
+                <a:t>IBF TIF</a:t>
+              </a:r>
+            </a:p>
+            <a:p>
+              <a:pPr algn="ctr"/>
+              <a:r>
+                <a:rPr lang="en-US" altLang="zh-CN" sz="1600" dirty="0">
+                  <a:cs typeface="Times New Roman" panose="02020603050405020304" pitchFamily="18" charset="0"/>
+                </a:rPr>
+                <a:t> FWHM = 4 mm</a:t>
+              </a:r>
+              <a:endParaRPr lang="zh-CN" altLang="en-US" sz="1600" dirty="0">
                 <a:cs typeface="Times New Roman" panose="02020603050405020304" pitchFamily="18" charset="0"/>
-              </a:rPr>
-              <a:t>TIF</a:t>
-            </a:r>
-          </a:p>
-          <a:p>
-            <a:pPr algn="ctr"/>
-            <a:r>
-              <a:rPr lang="en-US" altLang="zh-CN" sz="1600" dirty="0">
+              </a:endParaRPr>
+            </a:p>
+          </p:txBody>
+        </p:sp>
+        <p:pic>
+          <p:nvPicPr>
+            <p:cNvPr id="38" name="图片 7">
+              <a:extLst>
+                <a:ext uri="{FF2B5EF4-FFF2-40B4-BE49-F238E27FC236}">
+                  <a16:creationId xmlns:a16="http://schemas.microsoft.com/office/drawing/2014/main" id="{0FD68AC6-E089-0B2B-0E39-CDC3FD1AACA5}"/>
+                </a:ext>
+              </a:extLst>
+            </p:cNvPr>
+            <p:cNvPicPr>
+              <a:picLocks noChangeAspect="1"/>
+            </p:cNvPicPr>
+            <p:nvPr/>
+          </p:nvPicPr>
+          <p:blipFill rotWithShape="1">
+            <a:blip r:embed="rId2"/>
+            <a:srcRect l="13131" t="15842" r="20771" b="14014"/>
+            <a:stretch/>
+          </p:blipFill>
+          <p:spPr>
+            <a:xfrm>
+              <a:off x="3996536" y="437902"/>
+              <a:ext cx="1241437" cy="1253488"/>
+            </a:xfrm>
+            <a:prstGeom prst="rect">
+              <a:avLst/>
+            </a:prstGeom>
+          </p:spPr>
+        </p:pic>
+        <p:sp>
+          <p:nvSpPr>
+            <p:cNvPr id="39" name="文本框 9">
+              <a:extLst>
+                <a:ext uri="{FF2B5EF4-FFF2-40B4-BE49-F238E27FC236}">
+                  <a16:creationId xmlns:a16="http://schemas.microsoft.com/office/drawing/2014/main" id="{C299F469-7279-DBD5-3246-A9958DC62BAD}"/>
+                </a:ext>
+              </a:extLst>
+            </p:cNvPr>
+            <p:cNvSpPr txBox="1"/>
+            <p:nvPr/>
+          </p:nvSpPr>
+          <p:spPr>
+            <a:xfrm>
+              <a:off x="5163824" y="213465"/>
+              <a:ext cx="530915" cy="307777"/>
+            </a:xfrm>
+            <a:prstGeom prst="rect">
+              <a:avLst/>
+            </a:prstGeom>
+            <a:noFill/>
+            <a:ln>
+              <a:noFill/>
+            </a:ln>
+          </p:spPr>
+          <p:txBody>
+            <a:bodyPr wrap="none" rtlCol="0">
+              <a:spAutoFit/>
+            </a:bodyPr>
+            <a:lstStyle/>
+            <a:p>
+              <a:pPr algn="ctr"/>
+              <a:r>
+                <a:rPr lang="en-US" altLang="zh-CN" sz="1400" dirty="0">
+                  <a:cs typeface="Times New Roman" panose="02020603050405020304" pitchFamily="18" charset="0"/>
+                </a:rPr>
+                <a:t>[nm]</a:t>
+              </a:r>
+              <a:endParaRPr lang="zh-CN" altLang="en-US" sz="1400" dirty="0">
                 <a:cs typeface="Times New Roman" panose="02020603050405020304" pitchFamily="18" charset="0"/>
-              </a:rPr>
-              <a:t> FWHM = 4 mm</a:t>
-            </a:r>
-            <a:endParaRPr lang="zh-CN" altLang="en-US" sz="1600" dirty="0">
-              <a:cs typeface="Times New Roman" panose="02020603050405020304" pitchFamily="18" charset="0"/>
-            </a:endParaRPr>
-          </a:p>
-        </p:txBody>
-      </p:sp>
-      <p:pic>
-        <p:nvPicPr>
-          <p:cNvPr id="8" name="图片 7">
-            <a:extLst>
-              <a:ext uri="{FF2B5EF4-FFF2-40B4-BE49-F238E27FC236}">
-                <a16:creationId xmlns:a16="http://schemas.microsoft.com/office/drawing/2014/main" id="{C77C75B6-EE80-20D2-C8D7-A6AB68838D7F}"/>
-              </a:ext>
-            </a:extLst>
-          </p:cNvPr>
-          <p:cNvPicPr>
-            <a:picLocks noChangeAspect="1"/>
-          </p:cNvPicPr>
-          <p:nvPr/>
-        </p:nvPicPr>
-        <p:blipFill rotWithShape="1">
-          <a:blip r:embed="rId2"/>
-          <a:srcRect l="13131" t="15842" r="20771" b="14014"/>
-          <a:stretch/>
-        </p:blipFill>
-        <p:spPr>
-          <a:xfrm>
-            <a:off x="4378253" y="437902"/>
-            <a:ext cx="1241437" cy="1253488"/>
-          </a:xfrm>
-          <a:prstGeom prst="rect">
-            <a:avLst/>
-          </a:prstGeom>
-        </p:spPr>
-      </p:pic>
-      <p:sp>
-        <p:nvSpPr>
-          <p:cNvPr id="9" name="文本框 9">
-            <a:extLst>
-              <a:ext uri="{FF2B5EF4-FFF2-40B4-BE49-F238E27FC236}">
-                <a16:creationId xmlns:a16="http://schemas.microsoft.com/office/drawing/2014/main" id="{1438448F-A904-0345-9142-23BB512E64FF}"/>
-              </a:ext>
-            </a:extLst>
-          </p:cNvPr>
-          <p:cNvSpPr txBox="1"/>
-          <p:nvPr/>
-        </p:nvSpPr>
-        <p:spPr>
-          <a:xfrm>
-            <a:off x="5545541" y="213465"/>
-            <a:ext cx="530915" cy="307777"/>
-          </a:xfrm>
-          <a:prstGeom prst="rect">
-            <a:avLst/>
-          </a:prstGeom>
-          <a:noFill/>
-          <a:ln>
+              </a:endParaRPr>
+            </a:p>
+          </p:txBody>
+        </p:sp>
+        <p:sp>
+          <p:nvSpPr>
+            <p:cNvPr id="40" name="文本框 9">
+              <a:extLst>
+                <a:ext uri="{FF2B5EF4-FFF2-40B4-BE49-F238E27FC236}">
+                  <a16:creationId xmlns:a16="http://schemas.microsoft.com/office/drawing/2014/main" id="{83A17D3F-1DFD-6016-3B55-A04A59027750}"/>
+                </a:ext>
+              </a:extLst>
+            </p:cNvPr>
+            <p:cNvSpPr txBox="1"/>
+            <p:nvPr/>
+          </p:nvSpPr>
+          <p:spPr>
+            <a:xfrm>
+              <a:off x="5389333" y="1416740"/>
+              <a:ext cx="426974" cy="307777"/>
+            </a:xfrm>
+            <a:prstGeom prst="rect">
+              <a:avLst/>
+            </a:prstGeom>
             <a:noFill/>
-          </a:ln>
-        </p:spPr>
-        <p:txBody>
-          <a:bodyPr wrap="none" rtlCol="0">
-            <a:spAutoFit/>
-          </a:bodyPr>
-          <a:lstStyle/>
-          <a:p>
-            <a:pPr algn="ctr"/>
-            <a:r>
-              <a:rPr lang="en-US" altLang="zh-CN" sz="1400" dirty="0">
+            <a:ln>
+              <a:noFill/>
+            </a:ln>
+          </p:spPr>
+          <p:txBody>
+            <a:bodyPr wrap="square" rtlCol="0">
+              <a:spAutoFit/>
+            </a:bodyPr>
+            <a:lstStyle/>
+            <a:p>
+              <a:pPr algn="ctr"/>
+              <a:r>
+                <a:rPr lang="en-US" altLang="zh-CN" sz="1400" dirty="0">
+                  <a:cs typeface="Times New Roman" panose="02020603050405020304" pitchFamily="18" charset="0"/>
+                </a:rPr>
+                <a:t>0</a:t>
+              </a:r>
+              <a:endParaRPr lang="zh-CN" altLang="en-US" sz="1400" dirty="0">
                 <a:cs typeface="Times New Roman" panose="02020603050405020304" pitchFamily="18" charset="0"/>
-              </a:rPr>
-              <a:t>[nm]</a:t>
-            </a:r>
-            <a:endParaRPr lang="zh-CN" altLang="en-US" sz="1400" dirty="0">
-              <a:cs typeface="Times New Roman" panose="02020603050405020304" pitchFamily="18" charset="0"/>
-            </a:endParaRPr>
-          </a:p>
-        </p:txBody>
-      </p:sp>
-      <p:sp>
-        <p:nvSpPr>
-          <p:cNvPr id="10" name="文本框 9">
-            <a:extLst>
-              <a:ext uri="{FF2B5EF4-FFF2-40B4-BE49-F238E27FC236}">
-                <a16:creationId xmlns:a16="http://schemas.microsoft.com/office/drawing/2014/main" id="{58C2251C-B32E-0027-1FD6-453298799678}"/>
-              </a:ext>
-            </a:extLst>
-          </p:cNvPr>
-          <p:cNvSpPr txBox="1"/>
-          <p:nvPr/>
-        </p:nvSpPr>
-        <p:spPr>
-          <a:xfrm>
-            <a:off x="5771050" y="1416740"/>
-            <a:ext cx="426974" cy="307777"/>
-          </a:xfrm>
-          <a:prstGeom prst="rect">
-            <a:avLst/>
-          </a:prstGeom>
-          <a:noFill/>
-          <a:ln>
+              </a:endParaRPr>
+            </a:p>
+          </p:txBody>
+        </p:sp>
+        <p:sp>
+          <p:nvSpPr>
+            <p:cNvPr id="41" name="文本框 9">
+              <a:extLst>
+                <a:ext uri="{FF2B5EF4-FFF2-40B4-BE49-F238E27FC236}">
+                  <a16:creationId xmlns:a16="http://schemas.microsoft.com/office/drawing/2014/main" id="{0A052E7B-A0D4-F46A-99B4-044BB678E84C}"/>
+                </a:ext>
+              </a:extLst>
+            </p:cNvPr>
+            <p:cNvSpPr txBox="1"/>
+            <p:nvPr/>
+          </p:nvSpPr>
+          <p:spPr>
+            <a:xfrm>
+              <a:off x="5397669" y="384082"/>
+              <a:ext cx="426974" cy="307777"/>
+            </a:xfrm>
+            <a:prstGeom prst="rect">
+              <a:avLst/>
+            </a:prstGeom>
             <a:noFill/>
-          </a:ln>
-        </p:spPr>
-        <p:txBody>
-          <a:bodyPr wrap="square" rtlCol="0">
-            <a:spAutoFit/>
-          </a:bodyPr>
-          <a:lstStyle/>
-          <a:p>
-            <a:pPr algn="ctr"/>
-            <a:r>
-              <a:rPr lang="en-US" altLang="zh-CN" sz="1400" dirty="0">
+            <a:ln>
+              <a:noFill/>
+            </a:ln>
+          </p:spPr>
+          <p:txBody>
+            <a:bodyPr wrap="square" rtlCol="0">
+              <a:spAutoFit/>
+            </a:bodyPr>
+            <a:lstStyle/>
+            <a:p>
+              <a:pPr algn="ctr"/>
+              <a:r>
+                <a:rPr lang="en-US" altLang="zh-CN" sz="1400" dirty="0">
+                  <a:cs typeface="Times New Roman" panose="02020603050405020304" pitchFamily="18" charset="0"/>
+                </a:rPr>
+                <a:t>8</a:t>
+              </a:r>
+              <a:endParaRPr lang="zh-CN" altLang="en-US" sz="1400" dirty="0">
                 <a:cs typeface="Times New Roman" panose="02020603050405020304" pitchFamily="18" charset="0"/>
-              </a:rPr>
-              <a:t>0</a:t>
-            </a:r>
-            <a:endParaRPr lang="zh-CN" altLang="en-US" sz="1400" dirty="0">
-              <a:cs typeface="Times New Roman" panose="02020603050405020304" pitchFamily="18" charset="0"/>
-            </a:endParaRPr>
-          </a:p>
-        </p:txBody>
-      </p:sp>
-      <p:sp>
-        <p:nvSpPr>
-          <p:cNvPr id="11" name="文本框 9">
-            <a:extLst>
-              <a:ext uri="{FF2B5EF4-FFF2-40B4-BE49-F238E27FC236}">
-                <a16:creationId xmlns:a16="http://schemas.microsoft.com/office/drawing/2014/main" id="{D41F1712-B80B-BE89-B444-AFEE0163BEDB}"/>
-              </a:ext>
-            </a:extLst>
-          </p:cNvPr>
-          <p:cNvSpPr txBox="1"/>
-          <p:nvPr/>
-        </p:nvSpPr>
-        <p:spPr>
-          <a:xfrm>
-            <a:off x="5779386" y="384082"/>
-            <a:ext cx="426974" cy="307777"/>
-          </a:xfrm>
-          <a:prstGeom prst="rect">
-            <a:avLst/>
-          </a:prstGeom>
-          <a:noFill/>
-          <a:ln>
+              </a:endParaRPr>
+            </a:p>
+          </p:txBody>
+        </p:sp>
+        <p:cxnSp>
+          <p:nvCxnSpPr>
+            <p:cNvPr id="42" name="直接连接符 11">
+              <a:extLst>
+                <a:ext uri="{FF2B5EF4-FFF2-40B4-BE49-F238E27FC236}">
+                  <a16:creationId xmlns:a16="http://schemas.microsoft.com/office/drawing/2014/main" id="{98B0E893-B951-2C32-7BF2-A4168364506D}"/>
+                </a:ext>
+              </a:extLst>
+            </p:cNvPr>
+            <p:cNvCxnSpPr>
+              <a:cxnSpLocks/>
+            </p:cNvCxnSpPr>
+            <p:nvPr/>
+          </p:nvCxnSpPr>
+          <p:spPr>
+            <a:xfrm>
+              <a:off x="4034791" y="1674325"/>
+              <a:ext cx="0" cy="215034"/>
+            </a:xfrm>
+            <a:prstGeom prst="line">
+              <a:avLst/>
+            </a:prstGeom>
+            <a:ln w="12700">
+              <a:solidFill>
+                <a:schemeClr val="tx1"/>
+              </a:solidFill>
+            </a:ln>
+          </p:spPr>
+          <p:style>
+            <a:lnRef idx="1">
+              <a:schemeClr val="accent1"/>
+            </a:lnRef>
+            <a:fillRef idx="0">
+              <a:schemeClr val="accent1"/>
+            </a:fillRef>
+            <a:effectRef idx="0">
+              <a:schemeClr val="accent1"/>
+            </a:effectRef>
+            <a:fontRef idx="minor">
+              <a:schemeClr val="tx1"/>
+            </a:fontRef>
+          </p:style>
+        </p:cxnSp>
+        <p:cxnSp>
+          <p:nvCxnSpPr>
+            <p:cNvPr id="43" name="直接连接符 12">
+              <a:extLst>
+                <a:ext uri="{FF2B5EF4-FFF2-40B4-BE49-F238E27FC236}">
+                  <a16:creationId xmlns:a16="http://schemas.microsoft.com/office/drawing/2014/main" id="{E5DE06A3-399C-3F9D-27BC-72130FB45551}"/>
+                </a:ext>
+              </a:extLst>
+            </p:cNvPr>
+            <p:cNvCxnSpPr>
+              <a:cxnSpLocks/>
+            </p:cNvCxnSpPr>
+            <p:nvPr/>
+          </p:nvCxnSpPr>
+          <p:spPr>
+            <a:xfrm>
+              <a:off x="5191359" y="1674325"/>
+              <a:ext cx="0" cy="215034"/>
+            </a:xfrm>
+            <a:prstGeom prst="line">
+              <a:avLst/>
+            </a:prstGeom>
+            <a:ln w="12700">
+              <a:solidFill>
+                <a:schemeClr val="tx1"/>
+              </a:solidFill>
+            </a:ln>
+          </p:spPr>
+          <p:style>
+            <a:lnRef idx="1">
+              <a:schemeClr val="accent1"/>
+            </a:lnRef>
+            <a:fillRef idx="0">
+              <a:schemeClr val="accent1"/>
+            </a:fillRef>
+            <a:effectRef idx="0">
+              <a:schemeClr val="accent1"/>
+            </a:effectRef>
+            <a:fontRef idx="minor">
+              <a:schemeClr val="tx1"/>
+            </a:fontRef>
+          </p:style>
+        </p:cxnSp>
+        <p:cxnSp>
+          <p:nvCxnSpPr>
+            <p:cNvPr id="44" name="直接连接符 13">
+              <a:extLst>
+                <a:ext uri="{FF2B5EF4-FFF2-40B4-BE49-F238E27FC236}">
+                  <a16:creationId xmlns:a16="http://schemas.microsoft.com/office/drawing/2014/main" id="{83BE5C2A-149B-D80E-BAD7-7687E161F8A9}"/>
+                </a:ext>
+              </a:extLst>
+            </p:cNvPr>
+            <p:cNvCxnSpPr>
+              <a:cxnSpLocks/>
+            </p:cNvCxnSpPr>
+            <p:nvPr/>
+          </p:nvCxnSpPr>
+          <p:spPr>
+            <a:xfrm>
+              <a:off x="4034791" y="1832643"/>
+              <a:ext cx="1156568" cy="0"/>
+            </a:xfrm>
+            <a:prstGeom prst="line">
+              <a:avLst/>
+            </a:prstGeom>
+            <a:ln w="12700">
+              <a:solidFill>
+                <a:schemeClr val="tx1"/>
+              </a:solidFill>
+              <a:headEnd type="stealth"/>
+              <a:tailEnd type="stealth"/>
+            </a:ln>
+          </p:spPr>
+          <p:style>
+            <a:lnRef idx="1">
+              <a:schemeClr val="accent1"/>
+            </a:lnRef>
+            <a:fillRef idx="0">
+              <a:schemeClr val="accent1"/>
+            </a:fillRef>
+            <a:effectRef idx="0">
+              <a:schemeClr val="accent1"/>
+            </a:effectRef>
+            <a:fontRef idx="minor">
+              <a:schemeClr val="tx1"/>
+            </a:fontRef>
+          </p:style>
+        </p:cxnSp>
+        <p:sp>
+          <p:nvSpPr>
+            <p:cNvPr id="45" name="文本框 9">
+              <a:extLst>
+                <a:ext uri="{FF2B5EF4-FFF2-40B4-BE49-F238E27FC236}">
+                  <a16:creationId xmlns:a16="http://schemas.microsoft.com/office/drawing/2014/main" id="{D50C9826-3D5E-FAF3-A4CE-A99C99CA42B2}"/>
+                </a:ext>
+              </a:extLst>
+            </p:cNvPr>
+            <p:cNvSpPr txBox="1"/>
+            <p:nvPr/>
+          </p:nvSpPr>
+          <p:spPr>
+            <a:xfrm>
+              <a:off x="4025721" y="1581583"/>
+              <a:ext cx="1165634" cy="307777"/>
+            </a:xfrm>
+            <a:prstGeom prst="rect">
+              <a:avLst/>
+            </a:prstGeom>
             <a:noFill/>
-          </a:ln>
-        </p:spPr>
-        <p:txBody>
-          <a:bodyPr wrap="square" rtlCol="0">
-            <a:spAutoFit/>
-          </a:bodyPr>
-          <a:lstStyle/>
-          <a:p>
-            <a:pPr algn="ctr"/>
-            <a:r>
-              <a:rPr lang="en-US" altLang="zh-CN" sz="1400" dirty="0">
+            <a:ln>
+              <a:noFill/>
+            </a:ln>
+          </p:spPr>
+          <p:txBody>
+            <a:bodyPr wrap="square" rtlCol="0">
+              <a:spAutoFit/>
+            </a:bodyPr>
+            <a:lstStyle/>
+            <a:p>
+              <a:pPr algn="ctr"/>
+              <a:r>
+                <a:rPr lang="en-US" altLang="zh-CN" sz="1400" dirty="0">
+                  <a:cs typeface="Times New Roman" panose="02020603050405020304" pitchFamily="18" charset="0"/>
+                </a:rPr>
+                <a:t>10 mm</a:t>
+              </a:r>
+              <a:endParaRPr lang="zh-CN" altLang="en-US" sz="1400" dirty="0">
                 <a:cs typeface="Times New Roman" panose="02020603050405020304" pitchFamily="18" charset="0"/>
-              </a:rPr>
-              <a:t>8</a:t>
-            </a:r>
-            <a:endParaRPr lang="zh-CN" altLang="en-US" sz="1400" dirty="0">
-              <a:cs typeface="Times New Roman" panose="02020603050405020304" pitchFamily="18" charset="0"/>
-            </a:endParaRPr>
-          </a:p>
-        </p:txBody>
-      </p:sp>
-      <p:cxnSp>
-        <p:nvCxnSpPr>
-          <p:cNvPr id="12" name="直接连接符 11">
-            <a:extLst>
-              <a:ext uri="{FF2B5EF4-FFF2-40B4-BE49-F238E27FC236}">
-                <a16:creationId xmlns:a16="http://schemas.microsoft.com/office/drawing/2014/main" id="{06731EAD-C6DD-2025-2E33-1617F32FB155}"/>
-              </a:ext>
-            </a:extLst>
-          </p:cNvPr>
-          <p:cNvCxnSpPr>
-            <a:cxnSpLocks/>
-          </p:cNvCxnSpPr>
-          <p:nvPr/>
-        </p:nvCxnSpPr>
-        <p:spPr>
-          <a:xfrm>
-            <a:off x="4416508" y="1674325"/>
-            <a:ext cx="0" cy="215034"/>
-          </a:xfrm>
-          <a:prstGeom prst="line">
-            <a:avLst/>
-          </a:prstGeom>
-          <a:ln w="12700">
-            <a:solidFill>
+              </a:endParaRPr>
+            </a:p>
+          </p:txBody>
+        </p:sp>
+        <p:cxnSp>
+          <p:nvCxnSpPr>
+            <p:cNvPr id="46" name="直接连接符 15">
+              <a:extLst>
+                <a:ext uri="{FF2B5EF4-FFF2-40B4-BE49-F238E27FC236}">
+                  <a16:creationId xmlns:a16="http://schemas.microsoft.com/office/drawing/2014/main" id="{5B3728C9-8BE0-9064-8CC5-AFC8819D54C9}"/>
+                </a:ext>
+              </a:extLst>
+            </p:cNvPr>
+            <p:cNvCxnSpPr>
+              <a:cxnSpLocks/>
+            </p:cNvCxnSpPr>
+            <p:nvPr/>
+          </p:nvCxnSpPr>
+          <p:spPr>
+            <a:xfrm>
+              <a:off x="3783095" y="1645610"/>
+              <a:ext cx="213541" cy="0"/>
+            </a:xfrm>
+            <a:prstGeom prst="line">
+              <a:avLst/>
+            </a:prstGeom>
+            <a:ln w="12700">
+              <a:solidFill>
+                <a:schemeClr val="tx1"/>
+              </a:solidFill>
+            </a:ln>
+          </p:spPr>
+          <p:style>
+            <a:lnRef idx="1">
+              <a:schemeClr val="accent1"/>
+            </a:lnRef>
+            <a:fillRef idx="0">
+              <a:schemeClr val="accent1"/>
+            </a:fillRef>
+            <a:effectRef idx="0">
+              <a:schemeClr val="accent1"/>
+            </a:effectRef>
+            <a:fontRef idx="minor">
               <a:schemeClr val="tx1"/>
-            </a:solidFill>
-          </a:ln>
-        </p:spPr>
-        <p:style>
-          <a:lnRef idx="1">
-            <a:schemeClr val="accent1"/>
-          </a:lnRef>
-          <a:fillRef idx="0">
-            <a:schemeClr val="accent1"/>
-          </a:fillRef>
-          <a:effectRef idx="0">
-            <a:schemeClr val="accent1"/>
-          </a:effectRef>
-          <a:fontRef idx="minor">
-            <a:schemeClr val="tx1"/>
-          </a:fontRef>
-        </p:style>
-      </p:cxnSp>
-      <p:cxnSp>
-        <p:nvCxnSpPr>
-          <p:cNvPr id="13" name="直接连接符 12">
-            <a:extLst>
-              <a:ext uri="{FF2B5EF4-FFF2-40B4-BE49-F238E27FC236}">
-                <a16:creationId xmlns:a16="http://schemas.microsoft.com/office/drawing/2014/main" id="{4B97DB77-6CE2-0A1A-5626-370D74FA7F51}"/>
-              </a:ext>
-            </a:extLst>
-          </p:cNvPr>
-          <p:cNvCxnSpPr>
-            <a:cxnSpLocks/>
-          </p:cNvCxnSpPr>
-          <p:nvPr/>
-        </p:nvCxnSpPr>
-        <p:spPr>
-          <a:xfrm>
-            <a:off x="5573076" y="1674325"/>
-            <a:ext cx="0" cy="215034"/>
-          </a:xfrm>
-          <a:prstGeom prst="line">
-            <a:avLst/>
-          </a:prstGeom>
-          <a:ln w="12700">
-            <a:solidFill>
+            </a:fontRef>
+          </p:style>
+        </p:cxnSp>
+        <p:cxnSp>
+          <p:nvCxnSpPr>
+            <p:cNvPr id="47" name="直接连接符 16">
+              <a:extLst>
+                <a:ext uri="{FF2B5EF4-FFF2-40B4-BE49-F238E27FC236}">
+                  <a16:creationId xmlns:a16="http://schemas.microsoft.com/office/drawing/2014/main" id="{60D86269-E746-534C-D1FC-9EABA834B921}"/>
+                </a:ext>
+              </a:extLst>
+            </p:cNvPr>
+            <p:cNvCxnSpPr>
+              <a:cxnSpLocks/>
+            </p:cNvCxnSpPr>
+            <p:nvPr/>
+          </p:nvCxnSpPr>
+          <p:spPr>
+            <a:xfrm>
+              <a:off x="3782995" y="484295"/>
+              <a:ext cx="213541" cy="0"/>
+            </a:xfrm>
+            <a:prstGeom prst="line">
+              <a:avLst/>
+            </a:prstGeom>
+            <a:ln w="12700">
+              <a:solidFill>
+                <a:schemeClr val="tx1"/>
+              </a:solidFill>
+            </a:ln>
+          </p:spPr>
+          <p:style>
+            <a:lnRef idx="1">
+              <a:schemeClr val="accent1"/>
+            </a:lnRef>
+            <a:fillRef idx="0">
+              <a:schemeClr val="accent1"/>
+            </a:fillRef>
+            <a:effectRef idx="0">
+              <a:schemeClr val="accent1"/>
+            </a:effectRef>
+            <a:fontRef idx="minor">
               <a:schemeClr val="tx1"/>
-            </a:solidFill>
-          </a:ln>
-        </p:spPr>
-        <p:style>
-          <a:lnRef idx="1">
-            <a:schemeClr val="accent1"/>
-          </a:lnRef>
-          <a:fillRef idx="0">
-            <a:schemeClr val="accent1"/>
-          </a:fillRef>
-          <a:effectRef idx="0">
-            <a:schemeClr val="accent1"/>
-          </a:effectRef>
-          <a:fontRef idx="minor">
-            <a:schemeClr val="tx1"/>
-          </a:fontRef>
-        </p:style>
-      </p:cxnSp>
-      <p:cxnSp>
-        <p:nvCxnSpPr>
-          <p:cNvPr id="14" name="直接连接符 13">
-            <a:extLst>
-              <a:ext uri="{FF2B5EF4-FFF2-40B4-BE49-F238E27FC236}">
-                <a16:creationId xmlns:a16="http://schemas.microsoft.com/office/drawing/2014/main" id="{E3CC51ED-A239-F3AB-818C-28D217B270CB}"/>
-              </a:ext>
-            </a:extLst>
-          </p:cNvPr>
-          <p:cNvCxnSpPr>
-            <a:cxnSpLocks/>
-          </p:cNvCxnSpPr>
-          <p:nvPr/>
-        </p:nvCxnSpPr>
-        <p:spPr>
-          <a:xfrm>
-            <a:off x="4416508" y="1832643"/>
-            <a:ext cx="1156568" cy="0"/>
-          </a:xfrm>
-          <a:prstGeom prst="line">
-            <a:avLst/>
-          </a:prstGeom>
-          <a:ln w="12700">
-            <a:solidFill>
+            </a:fontRef>
+          </p:style>
+        </p:cxnSp>
+        <p:cxnSp>
+          <p:nvCxnSpPr>
+            <p:cNvPr id="48" name="直接连接符 17">
+              <a:extLst>
+                <a:ext uri="{FF2B5EF4-FFF2-40B4-BE49-F238E27FC236}">
+                  <a16:creationId xmlns:a16="http://schemas.microsoft.com/office/drawing/2014/main" id="{7E478D93-12FF-12D8-B7D9-01A95465F7B1}"/>
+                </a:ext>
+              </a:extLst>
+            </p:cNvPr>
+            <p:cNvCxnSpPr>
+              <a:cxnSpLocks/>
+            </p:cNvCxnSpPr>
+            <p:nvPr/>
+          </p:nvCxnSpPr>
+          <p:spPr>
+            <a:xfrm flipV="1">
+              <a:off x="3904407" y="484295"/>
+              <a:ext cx="0" cy="1160770"/>
+            </a:xfrm>
+            <a:prstGeom prst="line">
+              <a:avLst/>
+            </a:prstGeom>
+            <a:ln w="12700">
+              <a:solidFill>
+                <a:schemeClr val="tx1"/>
+              </a:solidFill>
+              <a:headEnd type="stealth"/>
+              <a:tailEnd type="stealth"/>
+            </a:ln>
+          </p:spPr>
+          <p:style>
+            <a:lnRef idx="1">
+              <a:schemeClr val="accent1"/>
+            </a:lnRef>
+            <a:fillRef idx="0">
+              <a:schemeClr val="accent1"/>
+            </a:fillRef>
+            <a:effectRef idx="0">
+              <a:schemeClr val="accent1"/>
+            </a:effectRef>
+            <a:fontRef idx="minor">
               <a:schemeClr val="tx1"/>
-            </a:solidFill>
-            <a:headEnd type="stealth"/>
-            <a:tailEnd type="stealth"/>
-          </a:ln>
-        </p:spPr>
-        <p:style>
-          <a:lnRef idx="1">
-            <a:schemeClr val="accent1"/>
-          </a:lnRef>
-          <a:fillRef idx="0">
-            <a:schemeClr val="accent1"/>
-          </a:fillRef>
-          <a:effectRef idx="0">
-            <a:schemeClr val="accent1"/>
-          </a:effectRef>
-          <a:fontRef idx="minor">
-            <a:schemeClr val="tx1"/>
-          </a:fontRef>
-        </p:style>
-      </p:cxnSp>
-      <p:sp>
-        <p:nvSpPr>
-          <p:cNvPr id="15" name="文本框 9">
-            <a:extLst>
-              <a:ext uri="{FF2B5EF4-FFF2-40B4-BE49-F238E27FC236}">
-                <a16:creationId xmlns:a16="http://schemas.microsoft.com/office/drawing/2014/main" id="{ACAD7C58-611D-0AB5-DF0F-0F82595954FB}"/>
-              </a:ext>
-            </a:extLst>
-          </p:cNvPr>
-          <p:cNvSpPr txBox="1"/>
-          <p:nvPr/>
-        </p:nvSpPr>
-        <p:spPr>
-          <a:xfrm>
-            <a:off x="4673135" y="1581583"/>
-            <a:ext cx="692818" cy="307777"/>
-          </a:xfrm>
-          <a:prstGeom prst="rect">
-            <a:avLst/>
-          </a:prstGeom>
-          <a:noFill/>
-          <a:ln>
+            </a:fontRef>
+          </p:style>
+        </p:cxnSp>
+        <p:sp>
+          <p:nvSpPr>
+            <p:cNvPr id="49" name="文本框 9">
+              <a:extLst>
+                <a:ext uri="{FF2B5EF4-FFF2-40B4-BE49-F238E27FC236}">
+                  <a16:creationId xmlns:a16="http://schemas.microsoft.com/office/drawing/2014/main" id="{C5CF3A31-476B-36B7-57EB-CB337CE010BE}"/>
+                </a:ext>
+              </a:extLst>
+            </p:cNvPr>
+            <p:cNvSpPr txBox="1"/>
+            <p:nvPr/>
+          </p:nvSpPr>
+          <p:spPr>
+            <a:xfrm rot="16200000">
+              <a:off x="3200718" y="910789"/>
+              <a:ext cx="1160767" cy="307777"/>
+            </a:xfrm>
+            <a:prstGeom prst="rect">
+              <a:avLst/>
+            </a:prstGeom>
             <a:noFill/>
-          </a:ln>
-        </p:spPr>
-        <p:txBody>
-          <a:bodyPr wrap="none" rtlCol="0">
-            <a:spAutoFit/>
-          </a:bodyPr>
-          <a:lstStyle/>
-          <a:p>
-            <a:pPr algn="ctr"/>
-            <a:r>
-              <a:rPr lang="en-US" altLang="zh-CN" sz="1400" dirty="0">
+            <a:ln>
+              <a:noFill/>
+            </a:ln>
+          </p:spPr>
+          <p:txBody>
+            <a:bodyPr wrap="square" rtlCol="0">
+              <a:spAutoFit/>
+            </a:bodyPr>
+            <a:lstStyle/>
+            <a:p>
+              <a:pPr algn="ctr"/>
+              <a:r>
+                <a:rPr lang="en-US" altLang="zh-CN" sz="1400" dirty="0">
+                  <a:cs typeface="Times New Roman" panose="02020603050405020304" pitchFamily="18" charset="0"/>
+                </a:rPr>
+                <a:t>10 mm</a:t>
+              </a:r>
+              <a:endParaRPr lang="zh-CN" altLang="en-US" sz="1400" dirty="0">
                 <a:cs typeface="Times New Roman" panose="02020603050405020304" pitchFamily="18" charset="0"/>
-              </a:rPr>
-              <a:t>10 mm</a:t>
-            </a:r>
-            <a:endParaRPr lang="zh-CN" altLang="en-US" sz="1400" dirty="0">
-              <a:cs typeface="Times New Roman" panose="02020603050405020304" pitchFamily="18" charset="0"/>
-            </a:endParaRPr>
-          </a:p>
-        </p:txBody>
-      </p:sp>
-      <p:cxnSp>
-        <p:nvCxnSpPr>
-          <p:cNvPr id="16" name="直接连接符 15">
-            <a:extLst>
-              <a:ext uri="{FF2B5EF4-FFF2-40B4-BE49-F238E27FC236}">
-                <a16:creationId xmlns:a16="http://schemas.microsoft.com/office/drawing/2014/main" id="{FCE5DCA1-63ED-A1ED-D1A9-B52D76E273F6}"/>
-              </a:ext>
-            </a:extLst>
-          </p:cNvPr>
-          <p:cNvCxnSpPr>
-            <a:cxnSpLocks/>
-          </p:cNvCxnSpPr>
-          <p:nvPr/>
-        </p:nvCxnSpPr>
-        <p:spPr>
-          <a:xfrm>
-            <a:off x="4164812" y="1645610"/>
-            <a:ext cx="213541" cy="0"/>
-          </a:xfrm>
-          <a:prstGeom prst="line">
-            <a:avLst/>
-          </a:prstGeom>
-          <a:ln w="12700">
-            <a:solidFill>
+              </a:endParaRPr>
+            </a:p>
+          </p:txBody>
+        </p:sp>
+        <p:pic>
+          <p:nvPicPr>
+            <p:cNvPr id="50" name="Picture 3">
+              <a:extLst>
+                <a:ext uri="{FF2B5EF4-FFF2-40B4-BE49-F238E27FC236}">
+                  <a16:creationId xmlns:a16="http://schemas.microsoft.com/office/drawing/2014/main" id="{96994F59-EF81-E48F-5010-F5CC2F84FC02}"/>
+                </a:ext>
+              </a:extLst>
+            </p:cNvPr>
+            <p:cNvPicPr>
+              <a:picLocks noChangeAspect="1"/>
+            </p:cNvPicPr>
+            <p:nvPr/>
+          </p:nvPicPr>
+          <p:blipFill rotWithShape="1">
+            <a:blip r:embed="rId3">
+              <a:extLst>
+                <a:ext uri="{28A0092B-C50C-407E-A947-70E740481C1C}">
+                  <a14:useLocalDpi xmlns:a14="http://schemas.microsoft.com/office/drawing/2010/main" val="0"/>
+                </a:ext>
+              </a:extLst>
+            </a:blip>
+            <a:srcRect l="24218" t="14323" r="33877"/>
+            <a:stretch/>
+          </p:blipFill>
+          <p:spPr>
+            <a:xfrm rot="5400000">
+              <a:off x="947082" y="-492551"/>
+              <a:ext cx="1949435" cy="2933560"/>
+            </a:xfrm>
+            <a:prstGeom prst="rect">
+              <a:avLst/>
+            </a:prstGeom>
+          </p:spPr>
+        </p:pic>
+        <p:cxnSp>
+          <p:nvCxnSpPr>
+            <p:cNvPr id="51" name="直接箭头连接符 6">
+              <a:extLst>
+                <a:ext uri="{FF2B5EF4-FFF2-40B4-BE49-F238E27FC236}">
+                  <a16:creationId xmlns:a16="http://schemas.microsoft.com/office/drawing/2014/main" id="{66466627-B524-EB02-9E77-0C960C936C5F}"/>
+                </a:ext>
+              </a:extLst>
+            </p:cNvPr>
+            <p:cNvCxnSpPr>
+              <a:cxnSpLocks/>
+              <a:stCxn id="52" idx="6"/>
+              <a:endCxn id="49" idx="0"/>
+            </p:cNvCxnSpPr>
+            <p:nvPr/>
+          </p:nvCxnSpPr>
+          <p:spPr>
+            <a:xfrm flipV="1">
+              <a:off x="1953800" y="1064677"/>
+              <a:ext cx="1673413" cy="1"/>
+            </a:xfrm>
+            <a:prstGeom prst="straightConnector1">
+              <a:avLst/>
+            </a:prstGeom>
+            <a:ln w="15875">
+              <a:solidFill>
+                <a:srgbClr val="001AFF"/>
+              </a:solidFill>
+              <a:tailEnd type="triangle"/>
+            </a:ln>
+          </p:spPr>
+          <p:style>
+            <a:lnRef idx="1">
+              <a:schemeClr val="accent1"/>
+            </a:lnRef>
+            <a:fillRef idx="0">
+              <a:schemeClr val="accent1"/>
+            </a:fillRef>
+            <a:effectRef idx="0">
+              <a:schemeClr val="accent1"/>
+            </a:effectRef>
+            <a:fontRef idx="minor">
               <a:schemeClr val="tx1"/>
-            </a:solidFill>
-          </a:ln>
-        </p:spPr>
-        <p:style>
-          <a:lnRef idx="1">
-            <a:schemeClr val="accent1"/>
-          </a:lnRef>
-          <a:fillRef idx="0">
-            <a:schemeClr val="accent1"/>
-          </a:fillRef>
-          <a:effectRef idx="0">
-            <a:schemeClr val="accent1"/>
-          </a:effectRef>
-          <a:fontRef idx="minor">
-            <a:schemeClr val="tx1"/>
-          </a:fontRef>
-        </p:style>
-      </p:cxnSp>
-      <p:cxnSp>
-        <p:nvCxnSpPr>
-          <p:cNvPr id="17" name="直接连接符 16">
-            <a:extLst>
-              <a:ext uri="{FF2B5EF4-FFF2-40B4-BE49-F238E27FC236}">
-                <a16:creationId xmlns:a16="http://schemas.microsoft.com/office/drawing/2014/main" id="{B10C8E06-029B-BF9A-2D2E-74C07C2EA244}"/>
-              </a:ext>
-            </a:extLst>
-          </p:cNvPr>
-          <p:cNvCxnSpPr>
-            <a:cxnSpLocks/>
-          </p:cNvCxnSpPr>
-          <p:nvPr/>
-        </p:nvCxnSpPr>
-        <p:spPr>
-          <a:xfrm>
-            <a:off x="4164712" y="484295"/>
-            <a:ext cx="213541" cy="0"/>
-          </a:xfrm>
-          <a:prstGeom prst="line">
-            <a:avLst/>
-          </a:prstGeom>
-          <a:ln w="12700">
-            <a:solidFill>
-              <a:schemeClr val="tx1"/>
-            </a:solidFill>
-          </a:ln>
-        </p:spPr>
-        <p:style>
-          <a:lnRef idx="1">
-            <a:schemeClr val="accent1"/>
-          </a:lnRef>
-          <a:fillRef idx="0">
-            <a:schemeClr val="accent1"/>
-          </a:fillRef>
-          <a:effectRef idx="0">
-            <a:schemeClr val="accent1"/>
-          </a:effectRef>
-          <a:fontRef idx="minor">
-            <a:schemeClr val="tx1"/>
-          </a:fontRef>
-        </p:style>
-      </p:cxnSp>
-      <p:cxnSp>
-        <p:nvCxnSpPr>
-          <p:cNvPr id="18" name="直接连接符 17">
-            <a:extLst>
-              <a:ext uri="{FF2B5EF4-FFF2-40B4-BE49-F238E27FC236}">
-                <a16:creationId xmlns:a16="http://schemas.microsoft.com/office/drawing/2014/main" id="{D69A363A-E20A-6ACD-CB1B-333510195DA2}"/>
-              </a:ext>
-            </a:extLst>
-          </p:cNvPr>
-          <p:cNvCxnSpPr>
-            <a:cxnSpLocks/>
-          </p:cNvCxnSpPr>
-          <p:nvPr/>
-        </p:nvCxnSpPr>
-        <p:spPr>
-          <a:xfrm flipV="1">
-            <a:off x="4286124" y="484295"/>
-            <a:ext cx="0" cy="1160770"/>
-          </a:xfrm>
-          <a:prstGeom prst="line">
-            <a:avLst/>
-          </a:prstGeom>
-          <a:ln w="12700">
-            <a:solidFill>
-              <a:schemeClr val="tx1"/>
-            </a:solidFill>
-            <a:headEnd type="stealth"/>
-            <a:tailEnd type="stealth"/>
-          </a:ln>
-        </p:spPr>
-        <p:style>
-          <a:lnRef idx="1">
-            <a:schemeClr val="accent1"/>
-          </a:lnRef>
-          <a:fillRef idx="0">
-            <a:schemeClr val="accent1"/>
-          </a:fillRef>
-          <a:effectRef idx="0">
-            <a:schemeClr val="accent1"/>
-          </a:effectRef>
-          <a:fontRef idx="minor">
-            <a:schemeClr val="tx1"/>
-          </a:fontRef>
-        </p:style>
-      </p:cxnSp>
-      <p:sp>
-        <p:nvSpPr>
-          <p:cNvPr id="19" name="文本框 9">
-            <a:extLst>
-              <a:ext uri="{FF2B5EF4-FFF2-40B4-BE49-F238E27FC236}">
-                <a16:creationId xmlns:a16="http://schemas.microsoft.com/office/drawing/2014/main" id="{0AEB2A49-257E-59F6-5944-A98B0A4E7A31}"/>
-              </a:ext>
-            </a:extLst>
-          </p:cNvPr>
-          <p:cNvSpPr txBox="1"/>
-          <p:nvPr/>
-        </p:nvSpPr>
-        <p:spPr>
-          <a:xfrm rot="16200000">
-            <a:off x="3766722" y="940664"/>
-            <a:ext cx="792191" cy="307777"/>
-          </a:xfrm>
-          <a:prstGeom prst="rect">
-            <a:avLst/>
-          </a:prstGeom>
-          <a:noFill/>
-          <a:ln>
+            </a:fontRef>
+          </p:style>
+        </p:cxnSp>
+        <p:sp>
+          <p:nvSpPr>
+            <p:cNvPr id="52" name="椭圆 20">
+              <a:extLst>
+                <a:ext uri="{FF2B5EF4-FFF2-40B4-BE49-F238E27FC236}">
+                  <a16:creationId xmlns:a16="http://schemas.microsoft.com/office/drawing/2014/main" id="{98A4790E-412E-22F2-EF00-C7F114513E2E}"/>
+                </a:ext>
+              </a:extLst>
+            </p:cNvPr>
+            <p:cNvSpPr/>
+            <p:nvPr/>
+          </p:nvSpPr>
+          <p:spPr>
+            <a:xfrm>
+              <a:off x="1333451" y="756358"/>
+              <a:ext cx="620349" cy="616639"/>
+            </a:xfrm>
+            <a:prstGeom prst="ellipse">
+              <a:avLst/>
+            </a:prstGeom>
             <a:noFill/>
-          </a:ln>
-        </p:spPr>
-        <p:txBody>
-          <a:bodyPr wrap="square" rtlCol="0">
-            <a:spAutoFit/>
-          </a:bodyPr>
-          <a:lstStyle/>
-          <a:p>
-            <a:pPr algn="ctr"/>
-            <a:r>
-              <a:rPr lang="en-US" altLang="zh-CN" sz="1400" dirty="0">
+            <a:ln w="28575">
+              <a:solidFill>
+                <a:srgbClr val="001AFF"/>
+              </a:solidFill>
+            </a:ln>
+          </p:spPr>
+          <p:style>
+            <a:lnRef idx="2">
+              <a:schemeClr val="accent1">
+                <a:shade val="50000"/>
+              </a:schemeClr>
+            </a:lnRef>
+            <a:fillRef idx="1">
+              <a:schemeClr val="accent1"/>
+            </a:fillRef>
+            <a:effectRef idx="0">
+              <a:schemeClr val="accent1"/>
+            </a:effectRef>
+            <a:fontRef idx="minor">
+              <a:schemeClr val="lt1"/>
+            </a:fontRef>
+          </p:style>
+          <p:txBody>
+            <a:bodyPr rtlCol="0" anchor="ctr"/>
+            <a:lstStyle/>
+            <a:p>
+              <a:pPr algn="ctr"/>
+              <a:endParaRPr lang="zh-CN" altLang="en-US"/>
+            </a:p>
+          </p:txBody>
+        </p:sp>
+        <p:sp>
+          <p:nvSpPr>
+            <p:cNvPr id="53" name="文本框 9">
+              <a:extLst>
+                <a:ext uri="{FF2B5EF4-FFF2-40B4-BE49-F238E27FC236}">
+                  <a16:creationId xmlns:a16="http://schemas.microsoft.com/office/drawing/2014/main" id="{D707F1A5-029C-8F64-CF05-CE85A48355AF}"/>
+                </a:ext>
+              </a:extLst>
+            </p:cNvPr>
+            <p:cNvSpPr txBox="1"/>
+            <p:nvPr/>
+          </p:nvSpPr>
+          <p:spPr>
+            <a:xfrm>
+              <a:off x="455018" y="-55089"/>
+              <a:ext cx="393267" cy="369332"/>
+            </a:xfrm>
+            <a:prstGeom prst="rect">
+              <a:avLst/>
+            </a:prstGeom>
+            <a:noFill/>
+          </p:spPr>
+          <p:txBody>
+            <a:bodyPr wrap="square" rtlCol="0">
+              <a:spAutoFit/>
+            </a:bodyPr>
+            <a:lstStyle/>
+            <a:p>
+              <a:pPr algn="ctr"/>
+              <a:r>
+                <a:rPr lang="en-US" altLang="zh-CN" b="1" dirty="0">
+                  <a:solidFill>
+                    <a:schemeClr val="bg1"/>
+                  </a:solidFill>
+                  <a:cs typeface="Times New Roman" panose="02020603050405020304" pitchFamily="18" charset="0"/>
+                </a:rPr>
+                <a:t>(a)</a:t>
+              </a:r>
+              <a:endParaRPr lang="zh-CN" altLang="en-US" b="1" dirty="0">
+                <a:solidFill>
+                  <a:schemeClr val="bg1"/>
+                </a:solidFill>
                 <a:cs typeface="Times New Roman" panose="02020603050405020304" pitchFamily="18" charset="0"/>
-              </a:rPr>
-              <a:t>10 mm</a:t>
-            </a:r>
-            <a:endParaRPr lang="zh-CN" altLang="en-US" sz="1400" dirty="0">
-              <a:cs typeface="Times New Roman" panose="02020603050405020304" pitchFamily="18" charset="0"/>
-            </a:endParaRPr>
-          </a:p>
-        </p:txBody>
-      </p:sp>
-      <p:pic>
-        <p:nvPicPr>
-          <p:cNvPr id="3" name="Picture 3">
-            <a:extLst>
-              <a:ext uri="{FF2B5EF4-FFF2-40B4-BE49-F238E27FC236}">
-                <a16:creationId xmlns:a16="http://schemas.microsoft.com/office/drawing/2014/main" id="{84401829-98C4-17B7-5B6B-1CD8ADE311AF}"/>
-              </a:ext>
-            </a:extLst>
-          </p:cNvPr>
-          <p:cNvPicPr>
-            <a:picLocks noChangeAspect="1"/>
-          </p:cNvPicPr>
-          <p:nvPr/>
-        </p:nvPicPr>
-        <p:blipFill rotWithShape="1">
-          <a:blip r:embed="rId3">
-            <a:extLst>
-              <a:ext uri="{28A0092B-C50C-407E-A947-70E740481C1C}">
-                <a14:useLocalDpi xmlns:a14="http://schemas.microsoft.com/office/drawing/2010/main" val="0"/>
-              </a:ext>
-            </a:extLst>
-          </a:blip>
-          <a:srcRect l="24218" t="14323" r="33877"/>
-          <a:stretch/>
-        </p:blipFill>
-        <p:spPr>
-          <a:xfrm rot="5400000">
-            <a:off x="947082" y="-492551"/>
-            <a:ext cx="1949435" cy="2933560"/>
-          </a:xfrm>
-          <a:prstGeom prst="rect">
-            <a:avLst/>
-          </a:prstGeom>
-        </p:spPr>
-      </p:pic>
-      <p:cxnSp>
-        <p:nvCxnSpPr>
-          <p:cNvPr id="7" name="直接箭头连接符 6">
-            <a:extLst>
-              <a:ext uri="{FF2B5EF4-FFF2-40B4-BE49-F238E27FC236}">
-                <a16:creationId xmlns:a16="http://schemas.microsoft.com/office/drawing/2014/main" id="{5BD2349E-B87F-0D42-939E-866606719DD8}"/>
-              </a:ext>
-            </a:extLst>
-          </p:cNvPr>
-          <p:cNvCxnSpPr>
-            <a:cxnSpLocks/>
-          </p:cNvCxnSpPr>
-          <p:nvPr/>
-        </p:nvCxnSpPr>
-        <p:spPr>
-          <a:xfrm>
-            <a:off x="1953800" y="1123448"/>
-            <a:ext cx="2055128" cy="0"/>
-          </a:xfrm>
-          <a:prstGeom prst="straightConnector1">
-            <a:avLst/>
-          </a:prstGeom>
-          <a:ln w="15875">
-            <a:solidFill>
-              <a:srgbClr val="3333CC"/>
-            </a:solidFill>
-            <a:tailEnd type="triangle"/>
-          </a:ln>
-        </p:spPr>
-        <p:style>
-          <a:lnRef idx="1">
-            <a:schemeClr val="accent1"/>
-          </a:lnRef>
-          <a:fillRef idx="0">
-            <a:schemeClr val="accent1"/>
-          </a:fillRef>
-          <a:effectRef idx="0">
-            <a:schemeClr val="accent1"/>
-          </a:effectRef>
-          <a:fontRef idx="minor">
-            <a:schemeClr val="tx1"/>
-          </a:fontRef>
-        </p:style>
-      </p:cxnSp>
-      <p:sp>
-        <p:nvSpPr>
-          <p:cNvPr id="21" name="椭圆 20">
-            <a:extLst>
-              <a:ext uri="{FF2B5EF4-FFF2-40B4-BE49-F238E27FC236}">
-                <a16:creationId xmlns:a16="http://schemas.microsoft.com/office/drawing/2014/main" id="{0E1C3096-73E6-3834-5B07-E34658763972}"/>
-              </a:ext>
-            </a:extLst>
-          </p:cNvPr>
-          <p:cNvSpPr/>
-          <p:nvPr/>
-        </p:nvSpPr>
-        <p:spPr>
-          <a:xfrm>
-            <a:off x="1333451" y="837699"/>
-            <a:ext cx="620349" cy="579040"/>
-          </a:xfrm>
-          <a:prstGeom prst="ellipse">
-            <a:avLst/>
-          </a:prstGeom>
-          <a:noFill/>
-          <a:ln w="28575">
-            <a:solidFill>
-              <a:srgbClr val="3333CC"/>
-            </a:solidFill>
-          </a:ln>
-        </p:spPr>
-        <p:style>
-          <a:lnRef idx="2">
-            <a:schemeClr val="accent1">
-              <a:shade val="50000"/>
-            </a:schemeClr>
-          </a:lnRef>
-          <a:fillRef idx="1">
-            <a:schemeClr val="accent1"/>
-          </a:fillRef>
-          <a:effectRef idx="0">
-            <a:schemeClr val="accent1"/>
-          </a:effectRef>
-          <a:fontRef idx="minor">
-            <a:schemeClr val="lt1"/>
-          </a:fontRef>
-        </p:style>
-        <p:txBody>
-          <a:bodyPr rtlCol="0" anchor="ctr"/>
-          <a:lstStyle/>
-          <a:p>
-            <a:pPr algn="ctr"/>
-            <a:endParaRPr lang="zh-CN" altLang="en-US"/>
-          </a:p>
-        </p:txBody>
-      </p:sp>
-      <p:sp>
-        <p:nvSpPr>
-          <p:cNvPr id="25" name="文本框 9">
-            <a:extLst>
-              <a:ext uri="{FF2B5EF4-FFF2-40B4-BE49-F238E27FC236}">
-                <a16:creationId xmlns:a16="http://schemas.microsoft.com/office/drawing/2014/main" id="{14D762B5-FF1F-6509-F52E-0F9A2F546B4F}"/>
-              </a:ext>
-            </a:extLst>
-          </p:cNvPr>
-          <p:cNvSpPr txBox="1"/>
-          <p:nvPr/>
-        </p:nvSpPr>
-        <p:spPr>
-          <a:xfrm>
-            <a:off x="-4703" y="-41343"/>
-            <a:ext cx="442750" cy="369332"/>
-          </a:xfrm>
-          <a:prstGeom prst="rect">
-            <a:avLst/>
-          </a:prstGeom>
-          <a:noFill/>
-        </p:spPr>
-        <p:txBody>
-          <a:bodyPr wrap="none" rtlCol="0">
-            <a:spAutoFit/>
-          </a:bodyPr>
-          <a:lstStyle/>
-          <a:p>
-            <a:r>
-              <a:rPr lang="en-US" altLang="zh-CN" b="1" dirty="0">
-                <a:cs typeface="Times New Roman" panose="02020603050405020304" pitchFamily="18" charset="0"/>
-              </a:rPr>
-              <a:t>(a)</a:t>
-            </a:r>
-            <a:endParaRPr lang="zh-CN" altLang="en-US" b="1" dirty="0">
-              <a:cs typeface="Times New Roman" panose="02020603050405020304" pitchFamily="18" charset="0"/>
-            </a:endParaRPr>
-          </a:p>
-        </p:txBody>
-      </p:sp>
+              </a:endParaRPr>
+            </a:p>
+          </p:txBody>
+        </p:sp>
+      </p:grpSp>
     </p:spTree>
     <p:extLst>
       <p:ext uri="{BB962C8B-B14F-4D97-AF65-F5344CB8AC3E}">
@@ -3793,7 +3823,7 @@
 <file path=ppt/theme/theme1.xml><?xml version="1.0" encoding="utf-8"?>
 <a:theme xmlns:a="http://schemas.openxmlformats.org/drawingml/2006/main" name="Office 主题​​">
   <a:themeElements>
-    <a:clrScheme name="Office 主题​​">
+    <a:clrScheme name="Office Theme">
       <a:dk1>
         <a:sysClr val="windowText" lastClr="000000"/>
       </a:dk1>
@@ -3831,7 +3861,7 @@
         <a:srgbClr val="954F72"/>
       </a:folHlink>
     </a:clrScheme>
-    <a:fontScheme name="Office 主题​​">
+    <a:fontScheme name="Office Theme">
       <a:majorFont>
         <a:latin typeface="Calibri Light" panose="020F0302020204030204"/>
         <a:ea typeface=""/>
@@ -3903,7 +3933,7 @@
         <a:font script="Geor" typeface="Sylfaen"/>
       </a:minorFont>
     </a:fontScheme>
-    <a:fmtScheme name="Office 主题​​">
+    <a:fmtScheme name="Office Theme">
       <a:fillStyleLst>
         <a:solidFill>
           <a:schemeClr val="phClr"/>

</xml_diff>